<commit_message>
Deployed c62af38 with MkDocs version: 1.3.1
</commit_message>
<xml_diff>
--- a/aulas/09-busca-global/slides.pptx
+++ b/aulas/09-busca-global/slides.pptx
@@ -274,6 +274,485 @@
 <file path=ppt/changesInfos/changesInfo1.xml><?xml version="1.0" encoding="utf-8"?>
 <pc:chgInfo xmlns:a="http://schemas.openxmlformats.org/drawingml/2006/main" xmlns:r="http://schemas.openxmlformats.org/officeDocument/2006/relationships" xmlns:ac="http://schemas.microsoft.com/office/drawing/2013/main/command" xmlns:pc="http://schemas.microsoft.com/office/powerpoint/2013/main/command">
   <pc:docChgLst>
+    <pc:chgData name="Luciano Pereira Soares" userId="16c53e34-c952-423e-8700-c0525d23304f" providerId="ADAL" clId="{21D76053-4FC2-8046-8E35-708C3EA86774}"/>
+    <pc:docChg chg="custSel delSld modSld modSection">
+      <pc:chgData name="Luciano Pereira Soares" userId="16c53e34-c952-423e-8700-c0525d23304f" providerId="ADAL" clId="{21D76053-4FC2-8046-8E35-708C3EA86774}" dt="2022-08-17T00:34:52.779" v="1" actId="2696"/>
+      <pc:docMkLst>
+        <pc:docMk/>
+      </pc:docMkLst>
+      <pc:sldChg chg="del">
+        <pc:chgData name="Luciano Pereira Soares" userId="16c53e34-c952-423e-8700-c0525d23304f" providerId="ADAL" clId="{21D76053-4FC2-8046-8E35-708C3EA86774}" dt="2022-08-17T00:34:52.779" v="1" actId="2696"/>
+        <pc:sldMkLst>
+          <pc:docMk/>
+          <pc:sldMk cId="0" sldId="256"/>
+        </pc:sldMkLst>
+      </pc:sldChg>
+      <pc:sldChg chg="del">
+        <pc:chgData name="Luciano Pereira Soares" userId="16c53e34-c952-423e-8700-c0525d23304f" providerId="ADAL" clId="{21D76053-4FC2-8046-8E35-708C3EA86774}" dt="2022-08-17T00:34:52.779" v="1" actId="2696"/>
+        <pc:sldMkLst>
+          <pc:docMk/>
+          <pc:sldMk cId="0" sldId="276"/>
+        </pc:sldMkLst>
+      </pc:sldChg>
+      <pc:sldChg chg="del">
+        <pc:chgData name="Luciano Pereira Soares" userId="16c53e34-c952-423e-8700-c0525d23304f" providerId="ADAL" clId="{21D76053-4FC2-8046-8E35-708C3EA86774}" dt="2022-08-17T00:34:52.779" v="1" actId="2696"/>
+        <pc:sldMkLst>
+          <pc:docMk/>
+          <pc:sldMk cId="3492238989" sldId="277"/>
+        </pc:sldMkLst>
+      </pc:sldChg>
+      <pc:sldChg chg="del">
+        <pc:chgData name="Luciano Pereira Soares" userId="16c53e34-c952-423e-8700-c0525d23304f" providerId="ADAL" clId="{21D76053-4FC2-8046-8E35-708C3EA86774}" dt="2022-08-17T00:34:52.779" v="1" actId="2696"/>
+        <pc:sldMkLst>
+          <pc:docMk/>
+          <pc:sldMk cId="1551982945" sldId="278"/>
+        </pc:sldMkLst>
+      </pc:sldChg>
+      <pc:sldChg chg="del">
+        <pc:chgData name="Luciano Pereira Soares" userId="16c53e34-c952-423e-8700-c0525d23304f" providerId="ADAL" clId="{21D76053-4FC2-8046-8E35-708C3EA86774}" dt="2022-08-17T00:34:52.779" v="1" actId="2696"/>
+        <pc:sldMkLst>
+          <pc:docMk/>
+          <pc:sldMk cId="1150689142" sldId="279"/>
+        </pc:sldMkLst>
+      </pc:sldChg>
+      <pc:sldChg chg="del">
+        <pc:chgData name="Luciano Pereira Soares" userId="16c53e34-c952-423e-8700-c0525d23304f" providerId="ADAL" clId="{21D76053-4FC2-8046-8E35-708C3EA86774}" dt="2022-08-17T00:34:52.779" v="1" actId="2696"/>
+        <pc:sldMkLst>
+          <pc:docMk/>
+          <pc:sldMk cId="956012993" sldId="280"/>
+        </pc:sldMkLst>
+      </pc:sldChg>
+      <pc:sldChg chg="del">
+        <pc:chgData name="Luciano Pereira Soares" userId="16c53e34-c952-423e-8700-c0525d23304f" providerId="ADAL" clId="{21D76053-4FC2-8046-8E35-708C3EA86774}" dt="2022-08-17T00:34:52.779" v="1" actId="2696"/>
+        <pc:sldMkLst>
+          <pc:docMk/>
+          <pc:sldMk cId="417571930" sldId="281"/>
+        </pc:sldMkLst>
+      </pc:sldChg>
+      <pc:sldChg chg="del">
+        <pc:chgData name="Luciano Pereira Soares" userId="16c53e34-c952-423e-8700-c0525d23304f" providerId="ADAL" clId="{21D76053-4FC2-8046-8E35-708C3EA86774}" dt="2022-08-17T00:34:52.779" v="1" actId="2696"/>
+        <pc:sldMkLst>
+          <pc:docMk/>
+          <pc:sldMk cId="1091742777" sldId="282"/>
+        </pc:sldMkLst>
+      </pc:sldChg>
+      <pc:sldChg chg="del">
+        <pc:chgData name="Luciano Pereira Soares" userId="16c53e34-c952-423e-8700-c0525d23304f" providerId="ADAL" clId="{21D76053-4FC2-8046-8E35-708C3EA86774}" dt="2022-08-17T00:34:52.779" v="1" actId="2696"/>
+        <pc:sldMkLst>
+          <pc:docMk/>
+          <pc:sldMk cId="1554898846" sldId="283"/>
+        </pc:sldMkLst>
+      </pc:sldChg>
+      <pc:sldChg chg="del">
+        <pc:chgData name="Luciano Pereira Soares" userId="16c53e34-c952-423e-8700-c0525d23304f" providerId="ADAL" clId="{21D76053-4FC2-8046-8E35-708C3EA86774}" dt="2022-08-17T00:34:52.779" v="1" actId="2696"/>
+        <pc:sldMkLst>
+          <pc:docMk/>
+          <pc:sldMk cId="1623398612" sldId="284"/>
+        </pc:sldMkLst>
+      </pc:sldChg>
+      <pc:sldChg chg="delSp del mod">
+        <pc:chgData name="Luciano Pereira Soares" userId="16c53e34-c952-423e-8700-c0525d23304f" providerId="ADAL" clId="{21D76053-4FC2-8046-8E35-708C3EA86774}" dt="2022-08-17T00:34:52.779" v="1" actId="2696"/>
+        <pc:sldMkLst>
+          <pc:docMk/>
+          <pc:sldMk cId="3610650140" sldId="285"/>
+        </pc:sldMkLst>
+        <pc:spChg chg="del">
+          <ac:chgData name="Luciano Pereira Soares" userId="16c53e34-c952-423e-8700-c0525d23304f" providerId="ADAL" clId="{21D76053-4FC2-8046-8E35-708C3EA86774}" dt="2022-08-15T21:48:35.069" v="0" actId="478"/>
+          <ac:spMkLst>
+            <pc:docMk/>
+            <pc:sldMk cId="3610650140" sldId="285"/>
+            <ac:spMk id="3" creationId="{92017288-34E3-384C-A876-1B3DB9BB03C6}"/>
+          </ac:spMkLst>
+        </pc:spChg>
+      </pc:sldChg>
+      <pc:sldChg chg="del">
+        <pc:chgData name="Luciano Pereira Soares" userId="16c53e34-c952-423e-8700-c0525d23304f" providerId="ADAL" clId="{21D76053-4FC2-8046-8E35-708C3EA86774}" dt="2022-08-17T00:34:52.779" v="1" actId="2696"/>
+        <pc:sldMkLst>
+          <pc:docMk/>
+          <pc:sldMk cId="1037304665" sldId="286"/>
+        </pc:sldMkLst>
+      </pc:sldChg>
+      <pc:sldChg chg="del">
+        <pc:chgData name="Luciano Pereira Soares" userId="16c53e34-c952-423e-8700-c0525d23304f" providerId="ADAL" clId="{21D76053-4FC2-8046-8E35-708C3EA86774}" dt="2022-08-17T00:34:52.779" v="1" actId="2696"/>
+        <pc:sldMkLst>
+          <pc:docMk/>
+          <pc:sldMk cId="1290008027" sldId="287"/>
+        </pc:sldMkLst>
+      </pc:sldChg>
+      <pc:sldChg chg="del">
+        <pc:chgData name="Luciano Pereira Soares" userId="16c53e34-c952-423e-8700-c0525d23304f" providerId="ADAL" clId="{21D76053-4FC2-8046-8E35-708C3EA86774}" dt="2022-08-17T00:34:52.779" v="1" actId="2696"/>
+        <pc:sldMkLst>
+          <pc:docMk/>
+          <pc:sldMk cId="3583880700" sldId="288"/>
+        </pc:sldMkLst>
+      </pc:sldChg>
+      <pc:sldChg chg="del">
+        <pc:chgData name="Luciano Pereira Soares" userId="16c53e34-c952-423e-8700-c0525d23304f" providerId="ADAL" clId="{21D76053-4FC2-8046-8E35-708C3EA86774}" dt="2022-08-17T00:34:52.779" v="1" actId="2696"/>
+        <pc:sldMkLst>
+          <pc:docMk/>
+          <pc:sldMk cId="2649827963" sldId="289"/>
+        </pc:sldMkLst>
+      </pc:sldChg>
+      <pc:sldChg chg="del">
+        <pc:chgData name="Luciano Pereira Soares" userId="16c53e34-c952-423e-8700-c0525d23304f" providerId="ADAL" clId="{21D76053-4FC2-8046-8E35-708C3EA86774}" dt="2022-08-17T00:34:52.779" v="1" actId="2696"/>
+        <pc:sldMkLst>
+          <pc:docMk/>
+          <pc:sldMk cId="141332155" sldId="290"/>
+        </pc:sldMkLst>
+      </pc:sldChg>
+      <pc:sldChg chg="del">
+        <pc:chgData name="Luciano Pereira Soares" userId="16c53e34-c952-423e-8700-c0525d23304f" providerId="ADAL" clId="{21D76053-4FC2-8046-8E35-708C3EA86774}" dt="2022-08-17T00:34:52.779" v="1" actId="2696"/>
+        <pc:sldMkLst>
+          <pc:docMk/>
+          <pc:sldMk cId="180960086" sldId="291"/>
+        </pc:sldMkLst>
+      </pc:sldChg>
+      <pc:sldChg chg="del">
+        <pc:chgData name="Luciano Pereira Soares" userId="16c53e34-c952-423e-8700-c0525d23304f" providerId="ADAL" clId="{21D76053-4FC2-8046-8E35-708C3EA86774}" dt="2022-08-17T00:34:52.779" v="1" actId="2696"/>
+        <pc:sldMkLst>
+          <pc:docMk/>
+          <pc:sldMk cId="1134358883" sldId="292"/>
+        </pc:sldMkLst>
+      </pc:sldChg>
+      <pc:sldChg chg="del">
+        <pc:chgData name="Luciano Pereira Soares" userId="16c53e34-c952-423e-8700-c0525d23304f" providerId="ADAL" clId="{21D76053-4FC2-8046-8E35-708C3EA86774}" dt="2022-08-17T00:34:52.779" v="1" actId="2696"/>
+        <pc:sldMkLst>
+          <pc:docMk/>
+          <pc:sldMk cId="4118138588" sldId="293"/>
+        </pc:sldMkLst>
+      </pc:sldChg>
+      <pc:sldChg chg="del">
+        <pc:chgData name="Luciano Pereira Soares" userId="16c53e34-c952-423e-8700-c0525d23304f" providerId="ADAL" clId="{21D76053-4FC2-8046-8E35-708C3EA86774}" dt="2022-08-17T00:34:52.779" v="1" actId="2696"/>
+        <pc:sldMkLst>
+          <pc:docMk/>
+          <pc:sldMk cId="388771689" sldId="294"/>
+        </pc:sldMkLst>
+      </pc:sldChg>
+      <pc:sldChg chg="del">
+        <pc:chgData name="Luciano Pereira Soares" userId="16c53e34-c952-423e-8700-c0525d23304f" providerId="ADAL" clId="{21D76053-4FC2-8046-8E35-708C3EA86774}" dt="2022-08-17T00:34:52.779" v="1" actId="2696"/>
+        <pc:sldMkLst>
+          <pc:docMk/>
+          <pc:sldMk cId="3626902687" sldId="295"/>
+        </pc:sldMkLst>
+      </pc:sldChg>
+      <pc:sldChg chg="del">
+        <pc:chgData name="Luciano Pereira Soares" userId="16c53e34-c952-423e-8700-c0525d23304f" providerId="ADAL" clId="{21D76053-4FC2-8046-8E35-708C3EA86774}" dt="2022-08-17T00:34:52.779" v="1" actId="2696"/>
+        <pc:sldMkLst>
+          <pc:docMk/>
+          <pc:sldMk cId="2084337191" sldId="296"/>
+        </pc:sldMkLst>
+      </pc:sldChg>
+      <pc:sldChg chg="del">
+        <pc:chgData name="Luciano Pereira Soares" userId="16c53e34-c952-423e-8700-c0525d23304f" providerId="ADAL" clId="{21D76053-4FC2-8046-8E35-708C3EA86774}" dt="2022-08-17T00:34:52.779" v="1" actId="2696"/>
+        <pc:sldMkLst>
+          <pc:docMk/>
+          <pc:sldMk cId="1073595821" sldId="297"/>
+        </pc:sldMkLst>
+      </pc:sldChg>
+      <pc:sldChg chg="del">
+        <pc:chgData name="Luciano Pereira Soares" userId="16c53e34-c952-423e-8700-c0525d23304f" providerId="ADAL" clId="{21D76053-4FC2-8046-8E35-708C3EA86774}" dt="2022-08-17T00:34:52.779" v="1" actId="2696"/>
+        <pc:sldMkLst>
+          <pc:docMk/>
+          <pc:sldMk cId="2045755376" sldId="298"/>
+        </pc:sldMkLst>
+      </pc:sldChg>
+      <pc:sldChg chg="del">
+        <pc:chgData name="Luciano Pereira Soares" userId="16c53e34-c952-423e-8700-c0525d23304f" providerId="ADAL" clId="{21D76053-4FC2-8046-8E35-708C3EA86774}" dt="2022-08-17T00:34:52.779" v="1" actId="2696"/>
+        <pc:sldMkLst>
+          <pc:docMk/>
+          <pc:sldMk cId="1374221417" sldId="299"/>
+        </pc:sldMkLst>
+      </pc:sldChg>
+      <pc:sldChg chg="del">
+        <pc:chgData name="Luciano Pereira Soares" userId="16c53e34-c952-423e-8700-c0525d23304f" providerId="ADAL" clId="{21D76053-4FC2-8046-8E35-708C3EA86774}" dt="2022-08-17T00:34:52.779" v="1" actId="2696"/>
+        <pc:sldMkLst>
+          <pc:docMk/>
+          <pc:sldMk cId="3034044073" sldId="300"/>
+        </pc:sldMkLst>
+      </pc:sldChg>
+      <pc:sldChg chg="del">
+        <pc:chgData name="Luciano Pereira Soares" userId="16c53e34-c952-423e-8700-c0525d23304f" providerId="ADAL" clId="{21D76053-4FC2-8046-8E35-708C3EA86774}" dt="2022-08-17T00:34:52.779" v="1" actId="2696"/>
+        <pc:sldMkLst>
+          <pc:docMk/>
+          <pc:sldMk cId="3269634474" sldId="301"/>
+        </pc:sldMkLst>
+      </pc:sldChg>
+      <pc:sldChg chg="del">
+        <pc:chgData name="Luciano Pereira Soares" userId="16c53e34-c952-423e-8700-c0525d23304f" providerId="ADAL" clId="{21D76053-4FC2-8046-8E35-708C3EA86774}" dt="2022-08-17T00:34:52.779" v="1" actId="2696"/>
+        <pc:sldMkLst>
+          <pc:docMk/>
+          <pc:sldMk cId="1573913687" sldId="302"/>
+        </pc:sldMkLst>
+      </pc:sldChg>
+      <pc:sldChg chg="del">
+        <pc:chgData name="Luciano Pereira Soares" userId="16c53e34-c952-423e-8700-c0525d23304f" providerId="ADAL" clId="{21D76053-4FC2-8046-8E35-708C3EA86774}" dt="2022-08-17T00:34:52.779" v="1" actId="2696"/>
+        <pc:sldMkLst>
+          <pc:docMk/>
+          <pc:sldMk cId="2727212897" sldId="303"/>
+        </pc:sldMkLst>
+      </pc:sldChg>
+      <pc:sldChg chg="del">
+        <pc:chgData name="Luciano Pereira Soares" userId="16c53e34-c952-423e-8700-c0525d23304f" providerId="ADAL" clId="{21D76053-4FC2-8046-8E35-708C3EA86774}" dt="2022-08-17T00:34:52.779" v="1" actId="2696"/>
+        <pc:sldMkLst>
+          <pc:docMk/>
+          <pc:sldMk cId="3251471121" sldId="304"/>
+        </pc:sldMkLst>
+      </pc:sldChg>
+      <pc:sldChg chg="del">
+        <pc:chgData name="Luciano Pereira Soares" userId="16c53e34-c952-423e-8700-c0525d23304f" providerId="ADAL" clId="{21D76053-4FC2-8046-8E35-708C3EA86774}" dt="2022-08-17T00:34:52.779" v="1" actId="2696"/>
+        <pc:sldMkLst>
+          <pc:docMk/>
+          <pc:sldMk cId="453157801" sldId="305"/>
+        </pc:sldMkLst>
+      </pc:sldChg>
+      <pc:sldChg chg="del">
+        <pc:chgData name="Luciano Pereira Soares" userId="16c53e34-c952-423e-8700-c0525d23304f" providerId="ADAL" clId="{21D76053-4FC2-8046-8E35-708C3EA86774}" dt="2022-08-17T00:34:52.779" v="1" actId="2696"/>
+        <pc:sldMkLst>
+          <pc:docMk/>
+          <pc:sldMk cId="1951566873" sldId="306"/>
+        </pc:sldMkLst>
+      </pc:sldChg>
+      <pc:sldChg chg="del">
+        <pc:chgData name="Luciano Pereira Soares" userId="16c53e34-c952-423e-8700-c0525d23304f" providerId="ADAL" clId="{21D76053-4FC2-8046-8E35-708C3EA86774}" dt="2022-08-17T00:34:52.779" v="1" actId="2696"/>
+        <pc:sldMkLst>
+          <pc:docMk/>
+          <pc:sldMk cId="3878185438" sldId="307"/>
+        </pc:sldMkLst>
+      </pc:sldChg>
+      <pc:sldChg chg="del">
+        <pc:chgData name="Luciano Pereira Soares" userId="16c53e34-c952-423e-8700-c0525d23304f" providerId="ADAL" clId="{21D76053-4FC2-8046-8E35-708C3EA86774}" dt="2022-08-17T00:34:52.779" v="1" actId="2696"/>
+        <pc:sldMkLst>
+          <pc:docMk/>
+          <pc:sldMk cId="3833048560" sldId="308"/>
+        </pc:sldMkLst>
+      </pc:sldChg>
+      <pc:sldChg chg="del">
+        <pc:chgData name="Luciano Pereira Soares" userId="16c53e34-c952-423e-8700-c0525d23304f" providerId="ADAL" clId="{21D76053-4FC2-8046-8E35-708C3EA86774}" dt="2022-08-17T00:34:52.779" v="1" actId="2696"/>
+        <pc:sldMkLst>
+          <pc:docMk/>
+          <pc:sldMk cId="4192908236" sldId="309"/>
+        </pc:sldMkLst>
+      </pc:sldChg>
+      <pc:sldChg chg="del">
+        <pc:chgData name="Luciano Pereira Soares" userId="16c53e34-c952-423e-8700-c0525d23304f" providerId="ADAL" clId="{21D76053-4FC2-8046-8E35-708C3EA86774}" dt="2022-08-17T00:34:52.779" v="1" actId="2696"/>
+        <pc:sldMkLst>
+          <pc:docMk/>
+          <pc:sldMk cId="2450581019" sldId="311"/>
+        </pc:sldMkLst>
+      </pc:sldChg>
+      <pc:sldChg chg="del">
+        <pc:chgData name="Luciano Pereira Soares" userId="16c53e34-c952-423e-8700-c0525d23304f" providerId="ADAL" clId="{21D76053-4FC2-8046-8E35-708C3EA86774}" dt="2022-08-17T00:34:52.779" v="1" actId="2696"/>
+        <pc:sldMkLst>
+          <pc:docMk/>
+          <pc:sldMk cId="2608316626" sldId="312"/>
+        </pc:sldMkLst>
+      </pc:sldChg>
+      <pc:sldChg chg="del">
+        <pc:chgData name="Luciano Pereira Soares" userId="16c53e34-c952-423e-8700-c0525d23304f" providerId="ADAL" clId="{21D76053-4FC2-8046-8E35-708C3EA86774}" dt="2022-08-17T00:34:52.779" v="1" actId="2696"/>
+        <pc:sldMkLst>
+          <pc:docMk/>
+          <pc:sldMk cId="1934957580" sldId="313"/>
+        </pc:sldMkLst>
+      </pc:sldChg>
+      <pc:sldChg chg="del">
+        <pc:chgData name="Luciano Pereira Soares" userId="16c53e34-c952-423e-8700-c0525d23304f" providerId="ADAL" clId="{21D76053-4FC2-8046-8E35-708C3EA86774}" dt="2022-08-17T00:34:52.779" v="1" actId="2696"/>
+        <pc:sldMkLst>
+          <pc:docMk/>
+          <pc:sldMk cId="2807832657" sldId="314"/>
+        </pc:sldMkLst>
+      </pc:sldChg>
+      <pc:sldChg chg="del">
+        <pc:chgData name="Luciano Pereira Soares" userId="16c53e34-c952-423e-8700-c0525d23304f" providerId="ADAL" clId="{21D76053-4FC2-8046-8E35-708C3EA86774}" dt="2022-08-17T00:34:52.779" v="1" actId="2696"/>
+        <pc:sldMkLst>
+          <pc:docMk/>
+          <pc:sldMk cId="1028870872" sldId="315"/>
+        </pc:sldMkLst>
+      </pc:sldChg>
+      <pc:sldChg chg="del">
+        <pc:chgData name="Luciano Pereira Soares" userId="16c53e34-c952-423e-8700-c0525d23304f" providerId="ADAL" clId="{21D76053-4FC2-8046-8E35-708C3EA86774}" dt="2022-08-17T00:34:52.779" v="1" actId="2696"/>
+        <pc:sldMkLst>
+          <pc:docMk/>
+          <pc:sldMk cId="1189783527" sldId="316"/>
+        </pc:sldMkLst>
+      </pc:sldChg>
+      <pc:sldChg chg="del">
+        <pc:chgData name="Luciano Pereira Soares" userId="16c53e34-c952-423e-8700-c0525d23304f" providerId="ADAL" clId="{21D76053-4FC2-8046-8E35-708C3EA86774}" dt="2022-08-17T00:34:52.779" v="1" actId="2696"/>
+        <pc:sldMkLst>
+          <pc:docMk/>
+          <pc:sldMk cId="1798049986" sldId="317"/>
+        </pc:sldMkLst>
+      </pc:sldChg>
+      <pc:sldChg chg="del">
+        <pc:chgData name="Luciano Pereira Soares" userId="16c53e34-c952-423e-8700-c0525d23304f" providerId="ADAL" clId="{21D76053-4FC2-8046-8E35-708C3EA86774}" dt="2022-08-17T00:34:52.779" v="1" actId="2696"/>
+        <pc:sldMkLst>
+          <pc:docMk/>
+          <pc:sldMk cId="1347503315" sldId="318"/>
+        </pc:sldMkLst>
+      </pc:sldChg>
+      <pc:sldChg chg="del">
+        <pc:chgData name="Luciano Pereira Soares" userId="16c53e34-c952-423e-8700-c0525d23304f" providerId="ADAL" clId="{21D76053-4FC2-8046-8E35-708C3EA86774}" dt="2022-08-17T00:34:52.779" v="1" actId="2696"/>
+        <pc:sldMkLst>
+          <pc:docMk/>
+          <pc:sldMk cId="1648801762" sldId="319"/>
+        </pc:sldMkLst>
+      </pc:sldChg>
+      <pc:sldChg chg="del">
+        <pc:chgData name="Luciano Pereira Soares" userId="16c53e34-c952-423e-8700-c0525d23304f" providerId="ADAL" clId="{21D76053-4FC2-8046-8E35-708C3EA86774}" dt="2022-08-17T00:34:52.779" v="1" actId="2696"/>
+        <pc:sldMkLst>
+          <pc:docMk/>
+          <pc:sldMk cId="3080152500" sldId="320"/>
+        </pc:sldMkLst>
+      </pc:sldChg>
+      <pc:sldChg chg="del">
+        <pc:chgData name="Luciano Pereira Soares" userId="16c53e34-c952-423e-8700-c0525d23304f" providerId="ADAL" clId="{21D76053-4FC2-8046-8E35-708C3EA86774}" dt="2022-08-17T00:34:52.779" v="1" actId="2696"/>
+        <pc:sldMkLst>
+          <pc:docMk/>
+          <pc:sldMk cId="1861366562" sldId="321"/>
+        </pc:sldMkLst>
+      </pc:sldChg>
+      <pc:sldChg chg="del">
+        <pc:chgData name="Luciano Pereira Soares" userId="16c53e34-c952-423e-8700-c0525d23304f" providerId="ADAL" clId="{21D76053-4FC2-8046-8E35-708C3EA86774}" dt="2022-08-17T00:34:52.779" v="1" actId="2696"/>
+        <pc:sldMkLst>
+          <pc:docMk/>
+          <pc:sldMk cId="380794106" sldId="322"/>
+        </pc:sldMkLst>
+      </pc:sldChg>
+      <pc:sldChg chg="del">
+        <pc:chgData name="Luciano Pereira Soares" userId="16c53e34-c952-423e-8700-c0525d23304f" providerId="ADAL" clId="{21D76053-4FC2-8046-8E35-708C3EA86774}" dt="2022-08-17T00:34:52.779" v="1" actId="2696"/>
+        <pc:sldMkLst>
+          <pc:docMk/>
+          <pc:sldMk cId="4089055669" sldId="323"/>
+        </pc:sldMkLst>
+      </pc:sldChg>
+      <pc:sldChg chg="del">
+        <pc:chgData name="Luciano Pereira Soares" userId="16c53e34-c952-423e-8700-c0525d23304f" providerId="ADAL" clId="{21D76053-4FC2-8046-8E35-708C3EA86774}" dt="2022-08-17T00:34:52.779" v="1" actId="2696"/>
+        <pc:sldMkLst>
+          <pc:docMk/>
+          <pc:sldMk cId="1832844973" sldId="324"/>
+        </pc:sldMkLst>
+      </pc:sldChg>
+      <pc:sldChg chg="del">
+        <pc:chgData name="Luciano Pereira Soares" userId="16c53e34-c952-423e-8700-c0525d23304f" providerId="ADAL" clId="{21D76053-4FC2-8046-8E35-708C3EA86774}" dt="2022-08-17T00:34:52.779" v="1" actId="2696"/>
+        <pc:sldMkLst>
+          <pc:docMk/>
+          <pc:sldMk cId="157196928" sldId="325"/>
+        </pc:sldMkLst>
+      </pc:sldChg>
+      <pc:sldChg chg="del">
+        <pc:chgData name="Luciano Pereira Soares" userId="16c53e34-c952-423e-8700-c0525d23304f" providerId="ADAL" clId="{21D76053-4FC2-8046-8E35-708C3EA86774}" dt="2022-08-17T00:34:52.779" v="1" actId="2696"/>
+        <pc:sldMkLst>
+          <pc:docMk/>
+          <pc:sldMk cId="1637131583" sldId="326"/>
+        </pc:sldMkLst>
+      </pc:sldChg>
+      <pc:sldChg chg="del">
+        <pc:chgData name="Luciano Pereira Soares" userId="16c53e34-c952-423e-8700-c0525d23304f" providerId="ADAL" clId="{21D76053-4FC2-8046-8E35-708C3EA86774}" dt="2022-08-17T00:34:52.779" v="1" actId="2696"/>
+        <pc:sldMkLst>
+          <pc:docMk/>
+          <pc:sldMk cId="3380530401" sldId="327"/>
+        </pc:sldMkLst>
+      </pc:sldChg>
+      <pc:sldChg chg="del">
+        <pc:chgData name="Luciano Pereira Soares" userId="16c53e34-c952-423e-8700-c0525d23304f" providerId="ADAL" clId="{21D76053-4FC2-8046-8E35-708C3EA86774}" dt="2022-08-17T00:34:52.779" v="1" actId="2696"/>
+        <pc:sldMkLst>
+          <pc:docMk/>
+          <pc:sldMk cId="65727687" sldId="328"/>
+        </pc:sldMkLst>
+      </pc:sldChg>
+      <pc:sldChg chg="del">
+        <pc:chgData name="Luciano Pereira Soares" userId="16c53e34-c952-423e-8700-c0525d23304f" providerId="ADAL" clId="{21D76053-4FC2-8046-8E35-708C3EA86774}" dt="2022-08-17T00:34:52.779" v="1" actId="2696"/>
+        <pc:sldMkLst>
+          <pc:docMk/>
+          <pc:sldMk cId="339457961" sldId="329"/>
+        </pc:sldMkLst>
+      </pc:sldChg>
+      <pc:sldChg chg="del">
+        <pc:chgData name="Luciano Pereira Soares" userId="16c53e34-c952-423e-8700-c0525d23304f" providerId="ADAL" clId="{21D76053-4FC2-8046-8E35-708C3EA86774}" dt="2022-08-17T00:34:52.779" v="1" actId="2696"/>
+        <pc:sldMkLst>
+          <pc:docMk/>
+          <pc:sldMk cId="520571115" sldId="330"/>
+        </pc:sldMkLst>
+      </pc:sldChg>
+      <pc:sldChg chg="del">
+        <pc:chgData name="Luciano Pereira Soares" userId="16c53e34-c952-423e-8700-c0525d23304f" providerId="ADAL" clId="{21D76053-4FC2-8046-8E35-708C3EA86774}" dt="2022-08-17T00:34:52.779" v="1" actId="2696"/>
+        <pc:sldMkLst>
+          <pc:docMk/>
+          <pc:sldMk cId="2164295974" sldId="331"/>
+        </pc:sldMkLst>
+      </pc:sldChg>
+      <pc:sldChg chg="del">
+        <pc:chgData name="Luciano Pereira Soares" userId="16c53e34-c952-423e-8700-c0525d23304f" providerId="ADAL" clId="{21D76053-4FC2-8046-8E35-708C3EA86774}" dt="2022-08-17T00:34:52.779" v="1" actId="2696"/>
+        <pc:sldMkLst>
+          <pc:docMk/>
+          <pc:sldMk cId="771695050" sldId="332"/>
+        </pc:sldMkLst>
+      </pc:sldChg>
+      <pc:sldChg chg="del">
+        <pc:chgData name="Luciano Pereira Soares" userId="16c53e34-c952-423e-8700-c0525d23304f" providerId="ADAL" clId="{21D76053-4FC2-8046-8E35-708C3EA86774}" dt="2022-08-17T00:34:52.779" v="1" actId="2696"/>
+        <pc:sldMkLst>
+          <pc:docMk/>
+          <pc:sldMk cId="3585071933" sldId="333"/>
+        </pc:sldMkLst>
+      </pc:sldChg>
+      <pc:sldChg chg="del">
+        <pc:chgData name="Luciano Pereira Soares" userId="16c53e34-c952-423e-8700-c0525d23304f" providerId="ADAL" clId="{21D76053-4FC2-8046-8E35-708C3EA86774}" dt="2022-08-17T00:34:52.779" v="1" actId="2696"/>
+        <pc:sldMkLst>
+          <pc:docMk/>
+          <pc:sldMk cId="1416409760" sldId="334"/>
+        </pc:sldMkLst>
+      </pc:sldChg>
+      <pc:sldChg chg="del">
+        <pc:chgData name="Luciano Pereira Soares" userId="16c53e34-c952-423e-8700-c0525d23304f" providerId="ADAL" clId="{21D76053-4FC2-8046-8E35-708C3EA86774}" dt="2022-08-17T00:34:52.779" v="1" actId="2696"/>
+        <pc:sldMkLst>
+          <pc:docMk/>
+          <pc:sldMk cId="2257655667" sldId="335"/>
+        </pc:sldMkLst>
+      </pc:sldChg>
+      <pc:sldChg chg="del">
+        <pc:chgData name="Luciano Pereira Soares" userId="16c53e34-c952-423e-8700-c0525d23304f" providerId="ADAL" clId="{21D76053-4FC2-8046-8E35-708C3EA86774}" dt="2022-08-17T00:34:52.779" v="1" actId="2696"/>
+        <pc:sldMkLst>
+          <pc:docMk/>
+          <pc:sldMk cId="3672068477" sldId="336"/>
+        </pc:sldMkLst>
+      </pc:sldChg>
+      <pc:sldChg chg="del">
+        <pc:chgData name="Luciano Pereira Soares" userId="16c53e34-c952-423e-8700-c0525d23304f" providerId="ADAL" clId="{21D76053-4FC2-8046-8E35-708C3EA86774}" dt="2022-08-17T00:34:52.779" v="1" actId="2696"/>
+        <pc:sldMkLst>
+          <pc:docMk/>
+          <pc:sldMk cId="2246476944" sldId="337"/>
+        </pc:sldMkLst>
+      </pc:sldChg>
+      <pc:sldChg chg="del">
+        <pc:chgData name="Luciano Pereira Soares" userId="16c53e34-c952-423e-8700-c0525d23304f" providerId="ADAL" clId="{21D76053-4FC2-8046-8E35-708C3EA86774}" dt="2022-08-17T00:34:52.779" v="1" actId="2696"/>
+        <pc:sldMkLst>
+          <pc:docMk/>
+          <pc:sldMk cId="96632061" sldId="356"/>
+        </pc:sldMkLst>
+      </pc:sldChg>
+      <pc:sldChg chg="del">
+        <pc:chgData name="Luciano Pereira Soares" userId="16c53e34-c952-423e-8700-c0525d23304f" providerId="ADAL" clId="{21D76053-4FC2-8046-8E35-708C3EA86774}" dt="2022-08-17T00:34:52.779" v="1" actId="2696"/>
+        <pc:sldMkLst>
+          <pc:docMk/>
+          <pc:sldMk cId="810874321" sldId="357"/>
+        </pc:sldMkLst>
+      </pc:sldChg>
+      <pc:sldChg chg="del">
+        <pc:chgData name="Luciano Pereira Soares" userId="16c53e34-c952-423e-8700-c0525d23304f" providerId="ADAL" clId="{21D76053-4FC2-8046-8E35-708C3EA86774}" dt="2022-08-17T00:34:52.779" v="1" actId="2696"/>
+        <pc:sldMkLst>
+          <pc:docMk/>
+          <pc:sldMk cId="372318287" sldId="554"/>
+        </pc:sldMkLst>
+      </pc:sldChg>
+      <pc:sldChg chg="del">
+        <pc:chgData name="Luciano Pereira Soares" userId="16c53e34-c952-423e-8700-c0525d23304f" providerId="ADAL" clId="{21D76053-4FC2-8046-8E35-708C3EA86774}" dt="2022-08-17T00:34:52.779" v="1" actId="2696"/>
+        <pc:sldMkLst>
+          <pc:docMk/>
+          <pc:sldMk cId="3155441199" sldId="555"/>
+        </pc:sldMkLst>
+      </pc:sldChg>
+    </pc:docChg>
+  </pc:docChgLst>
+  <pc:docChgLst>
     <pc:chgData name="Luciano Pereira Soares" userId="16c53e34-c952-423e-8700-c0525d23304f" providerId="ADAL" clId="{AEA032F2-1115-D14D-BBD7-8D36EDD06ADB}"/>
     <pc:docChg chg="delSld delSection modSection">
       <pc:chgData name="Luciano Pereira Soares" userId="16c53e34-c952-423e-8700-c0525d23304f" providerId="ADAL" clId="{AEA032F2-1115-D14D-BBD7-8D36EDD06ADB}" dt="2022-09-05T21:06:56.606" v="2" actId="17853"/>
@@ -1777,485 +2256,6 @@
             <ac:spMk id="4" creationId="{3B8D34AF-4651-D14B-84C4-E9FECE3D33FA}"/>
           </ac:spMkLst>
         </pc:spChg>
-      </pc:sldChg>
-    </pc:docChg>
-  </pc:docChgLst>
-  <pc:docChgLst>
-    <pc:chgData name="Luciano Pereira Soares" userId="16c53e34-c952-423e-8700-c0525d23304f" providerId="ADAL" clId="{21D76053-4FC2-8046-8E35-708C3EA86774}"/>
-    <pc:docChg chg="custSel delSld modSld modSection">
-      <pc:chgData name="Luciano Pereira Soares" userId="16c53e34-c952-423e-8700-c0525d23304f" providerId="ADAL" clId="{21D76053-4FC2-8046-8E35-708C3EA86774}" dt="2022-08-17T00:34:52.779" v="1" actId="2696"/>
-      <pc:docMkLst>
-        <pc:docMk/>
-      </pc:docMkLst>
-      <pc:sldChg chg="del">
-        <pc:chgData name="Luciano Pereira Soares" userId="16c53e34-c952-423e-8700-c0525d23304f" providerId="ADAL" clId="{21D76053-4FC2-8046-8E35-708C3EA86774}" dt="2022-08-17T00:34:52.779" v="1" actId="2696"/>
-        <pc:sldMkLst>
-          <pc:docMk/>
-          <pc:sldMk cId="0" sldId="256"/>
-        </pc:sldMkLst>
-      </pc:sldChg>
-      <pc:sldChg chg="del">
-        <pc:chgData name="Luciano Pereira Soares" userId="16c53e34-c952-423e-8700-c0525d23304f" providerId="ADAL" clId="{21D76053-4FC2-8046-8E35-708C3EA86774}" dt="2022-08-17T00:34:52.779" v="1" actId="2696"/>
-        <pc:sldMkLst>
-          <pc:docMk/>
-          <pc:sldMk cId="0" sldId="276"/>
-        </pc:sldMkLst>
-      </pc:sldChg>
-      <pc:sldChg chg="del">
-        <pc:chgData name="Luciano Pereira Soares" userId="16c53e34-c952-423e-8700-c0525d23304f" providerId="ADAL" clId="{21D76053-4FC2-8046-8E35-708C3EA86774}" dt="2022-08-17T00:34:52.779" v="1" actId="2696"/>
-        <pc:sldMkLst>
-          <pc:docMk/>
-          <pc:sldMk cId="3492238989" sldId="277"/>
-        </pc:sldMkLst>
-      </pc:sldChg>
-      <pc:sldChg chg="del">
-        <pc:chgData name="Luciano Pereira Soares" userId="16c53e34-c952-423e-8700-c0525d23304f" providerId="ADAL" clId="{21D76053-4FC2-8046-8E35-708C3EA86774}" dt="2022-08-17T00:34:52.779" v="1" actId="2696"/>
-        <pc:sldMkLst>
-          <pc:docMk/>
-          <pc:sldMk cId="1551982945" sldId="278"/>
-        </pc:sldMkLst>
-      </pc:sldChg>
-      <pc:sldChg chg="del">
-        <pc:chgData name="Luciano Pereira Soares" userId="16c53e34-c952-423e-8700-c0525d23304f" providerId="ADAL" clId="{21D76053-4FC2-8046-8E35-708C3EA86774}" dt="2022-08-17T00:34:52.779" v="1" actId="2696"/>
-        <pc:sldMkLst>
-          <pc:docMk/>
-          <pc:sldMk cId="1150689142" sldId="279"/>
-        </pc:sldMkLst>
-      </pc:sldChg>
-      <pc:sldChg chg="del">
-        <pc:chgData name="Luciano Pereira Soares" userId="16c53e34-c952-423e-8700-c0525d23304f" providerId="ADAL" clId="{21D76053-4FC2-8046-8E35-708C3EA86774}" dt="2022-08-17T00:34:52.779" v="1" actId="2696"/>
-        <pc:sldMkLst>
-          <pc:docMk/>
-          <pc:sldMk cId="956012993" sldId="280"/>
-        </pc:sldMkLst>
-      </pc:sldChg>
-      <pc:sldChg chg="del">
-        <pc:chgData name="Luciano Pereira Soares" userId="16c53e34-c952-423e-8700-c0525d23304f" providerId="ADAL" clId="{21D76053-4FC2-8046-8E35-708C3EA86774}" dt="2022-08-17T00:34:52.779" v="1" actId="2696"/>
-        <pc:sldMkLst>
-          <pc:docMk/>
-          <pc:sldMk cId="417571930" sldId="281"/>
-        </pc:sldMkLst>
-      </pc:sldChg>
-      <pc:sldChg chg="del">
-        <pc:chgData name="Luciano Pereira Soares" userId="16c53e34-c952-423e-8700-c0525d23304f" providerId="ADAL" clId="{21D76053-4FC2-8046-8E35-708C3EA86774}" dt="2022-08-17T00:34:52.779" v="1" actId="2696"/>
-        <pc:sldMkLst>
-          <pc:docMk/>
-          <pc:sldMk cId="1091742777" sldId="282"/>
-        </pc:sldMkLst>
-      </pc:sldChg>
-      <pc:sldChg chg="del">
-        <pc:chgData name="Luciano Pereira Soares" userId="16c53e34-c952-423e-8700-c0525d23304f" providerId="ADAL" clId="{21D76053-4FC2-8046-8E35-708C3EA86774}" dt="2022-08-17T00:34:52.779" v="1" actId="2696"/>
-        <pc:sldMkLst>
-          <pc:docMk/>
-          <pc:sldMk cId="1554898846" sldId="283"/>
-        </pc:sldMkLst>
-      </pc:sldChg>
-      <pc:sldChg chg="del">
-        <pc:chgData name="Luciano Pereira Soares" userId="16c53e34-c952-423e-8700-c0525d23304f" providerId="ADAL" clId="{21D76053-4FC2-8046-8E35-708C3EA86774}" dt="2022-08-17T00:34:52.779" v="1" actId="2696"/>
-        <pc:sldMkLst>
-          <pc:docMk/>
-          <pc:sldMk cId="1623398612" sldId="284"/>
-        </pc:sldMkLst>
-      </pc:sldChg>
-      <pc:sldChg chg="delSp del mod">
-        <pc:chgData name="Luciano Pereira Soares" userId="16c53e34-c952-423e-8700-c0525d23304f" providerId="ADAL" clId="{21D76053-4FC2-8046-8E35-708C3EA86774}" dt="2022-08-17T00:34:52.779" v="1" actId="2696"/>
-        <pc:sldMkLst>
-          <pc:docMk/>
-          <pc:sldMk cId="3610650140" sldId="285"/>
-        </pc:sldMkLst>
-        <pc:spChg chg="del">
-          <ac:chgData name="Luciano Pereira Soares" userId="16c53e34-c952-423e-8700-c0525d23304f" providerId="ADAL" clId="{21D76053-4FC2-8046-8E35-708C3EA86774}" dt="2022-08-15T21:48:35.069" v="0" actId="478"/>
-          <ac:spMkLst>
-            <pc:docMk/>
-            <pc:sldMk cId="3610650140" sldId="285"/>
-            <ac:spMk id="3" creationId="{92017288-34E3-384C-A876-1B3DB9BB03C6}"/>
-          </ac:spMkLst>
-        </pc:spChg>
-      </pc:sldChg>
-      <pc:sldChg chg="del">
-        <pc:chgData name="Luciano Pereira Soares" userId="16c53e34-c952-423e-8700-c0525d23304f" providerId="ADAL" clId="{21D76053-4FC2-8046-8E35-708C3EA86774}" dt="2022-08-17T00:34:52.779" v="1" actId="2696"/>
-        <pc:sldMkLst>
-          <pc:docMk/>
-          <pc:sldMk cId="1037304665" sldId="286"/>
-        </pc:sldMkLst>
-      </pc:sldChg>
-      <pc:sldChg chg="del">
-        <pc:chgData name="Luciano Pereira Soares" userId="16c53e34-c952-423e-8700-c0525d23304f" providerId="ADAL" clId="{21D76053-4FC2-8046-8E35-708C3EA86774}" dt="2022-08-17T00:34:52.779" v="1" actId="2696"/>
-        <pc:sldMkLst>
-          <pc:docMk/>
-          <pc:sldMk cId="1290008027" sldId="287"/>
-        </pc:sldMkLst>
-      </pc:sldChg>
-      <pc:sldChg chg="del">
-        <pc:chgData name="Luciano Pereira Soares" userId="16c53e34-c952-423e-8700-c0525d23304f" providerId="ADAL" clId="{21D76053-4FC2-8046-8E35-708C3EA86774}" dt="2022-08-17T00:34:52.779" v="1" actId="2696"/>
-        <pc:sldMkLst>
-          <pc:docMk/>
-          <pc:sldMk cId="3583880700" sldId="288"/>
-        </pc:sldMkLst>
-      </pc:sldChg>
-      <pc:sldChg chg="del">
-        <pc:chgData name="Luciano Pereira Soares" userId="16c53e34-c952-423e-8700-c0525d23304f" providerId="ADAL" clId="{21D76053-4FC2-8046-8E35-708C3EA86774}" dt="2022-08-17T00:34:52.779" v="1" actId="2696"/>
-        <pc:sldMkLst>
-          <pc:docMk/>
-          <pc:sldMk cId="2649827963" sldId="289"/>
-        </pc:sldMkLst>
-      </pc:sldChg>
-      <pc:sldChg chg="del">
-        <pc:chgData name="Luciano Pereira Soares" userId="16c53e34-c952-423e-8700-c0525d23304f" providerId="ADAL" clId="{21D76053-4FC2-8046-8E35-708C3EA86774}" dt="2022-08-17T00:34:52.779" v="1" actId="2696"/>
-        <pc:sldMkLst>
-          <pc:docMk/>
-          <pc:sldMk cId="141332155" sldId="290"/>
-        </pc:sldMkLst>
-      </pc:sldChg>
-      <pc:sldChg chg="del">
-        <pc:chgData name="Luciano Pereira Soares" userId="16c53e34-c952-423e-8700-c0525d23304f" providerId="ADAL" clId="{21D76053-4FC2-8046-8E35-708C3EA86774}" dt="2022-08-17T00:34:52.779" v="1" actId="2696"/>
-        <pc:sldMkLst>
-          <pc:docMk/>
-          <pc:sldMk cId="180960086" sldId="291"/>
-        </pc:sldMkLst>
-      </pc:sldChg>
-      <pc:sldChg chg="del">
-        <pc:chgData name="Luciano Pereira Soares" userId="16c53e34-c952-423e-8700-c0525d23304f" providerId="ADAL" clId="{21D76053-4FC2-8046-8E35-708C3EA86774}" dt="2022-08-17T00:34:52.779" v="1" actId="2696"/>
-        <pc:sldMkLst>
-          <pc:docMk/>
-          <pc:sldMk cId="1134358883" sldId="292"/>
-        </pc:sldMkLst>
-      </pc:sldChg>
-      <pc:sldChg chg="del">
-        <pc:chgData name="Luciano Pereira Soares" userId="16c53e34-c952-423e-8700-c0525d23304f" providerId="ADAL" clId="{21D76053-4FC2-8046-8E35-708C3EA86774}" dt="2022-08-17T00:34:52.779" v="1" actId="2696"/>
-        <pc:sldMkLst>
-          <pc:docMk/>
-          <pc:sldMk cId="4118138588" sldId="293"/>
-        </pc:sldMkLst>
-      </pc:sldChg>
-      <pc:sldChg chg="del">
-        <pc:chgData name="Luciano Pereira Soares" userId="16c53e34-c952-423e-8700-c0525d23304f" providerId="ADAL" clId="{21D76053-4FC2-8046-8E35-708C3EA86774}" dt="2022-08-17T00:34:52.779" v="1" actId="2696"/>
-        <pc:sldMkLst>
-          <pc:docMk/>
-          <pc:sldMk cId="388771689" sldId="294"/>
-        </pc:sldMkLst>
-      </pc:sldChg>
-      <pc:sldChg chg="del">
-        <pc:chgData name="Luciano Pereira Soares" userId="16c53e34-c952-423e-8700-c0525d23304f" providerId="ADAL" clId="{21D76053-4FC2-8046-8E35-708C3EA86774}" dt="2022-08-17T00:34:52.779" v="1" actId="2696"/>
-        <pc:sldMkLst>
-          <pc:docMk/>
-          <pc:sldMk cId="3626902687" sldId="295"/>
-        </pc:sldMkLst>
-      </pc:sldChg>
-      <pc:sldChg chg="del">
-        <pc:chgData name="Luciano Pereira Soares" userId="16c53e34-c952-423e-8700-c0525d23304f" providerId="ADAL" clId="{21D76053-4FC2-8046-8E35-708C3EA86774}" dt="2022-08-17T00:34:52.779" v="1" actId="2696"/>
-        <pc:sldMkLst>
-          <pc:docMk/>
-          <pc:sldMk cId="2084337191" sldId="296"/>
-        </pc:sldMkLst>
-      </pc:sldChg>
-      <pc:sldChg chg="del">
-        <pc:chgData name="Luciano Pereira Soares" userId="16c53e34-c952-423e-8700-c0525d23304f" providerId="ADAL" clId="{21D76053-4FC2-8046-8E35-708C3EA86774}" dt="2022-08-17T00:34:52.779" v="1" actId="2696"/>
-        <pc:sldMkLst>
-          <pc:docMk/>
-          <pc:sldMk cId="1073595821" sldId="297"/>
-        </pc:sldMkLst>
-      </pc:sldChg>
-      <pc:sldChg chg="del">
-        <pc:chgData name="Luciano Pereira Soares" userId="16c53e34-c952-423e-8700-c0525d23304f" providerId="ADAL" clId="{21D76053-4FC2-8046-8E35-708C3EA86774}" dt="2022-08-17T00:34:52.779" v="1" actId="2696"/>
-        <pc:sldMkLst>
-          <pc:docMk/>
-          <pc:sldMk cId="2045755376" sldId="298"/>
-        </pc:sldMkLst>
-      </pc:sldChg>
-      <pc:sldChg chg="del">
-        <pc:chgData name="Luciano Pereira Soares" userId="16c53e34-c952-423e-8700-c0525d23304f" providerId="ADAL" clId="{21D76053-4FC2-8046-8E35-708C3EA86774}" dt="2022-08-17T00:34:52.779" v="1" actId="2696"/>
-        <pc:sldMkLst>
-          <pc:docMk/>
-          <pc:sldMk cId="1374221417" sldId="299"/>
-        </pc:sldMkLst>
-      </pc:sldChg>
-      <pc:sldChg chg="del">
-        <pc:chgData name="Luciano Pereira Soares" userId="16c53e34-c952-423e-8700-c0525d23304f" providerId="ADAL" clId="{21D76053-4FC2-8046-8E35-708C3EA86774}" dt="2022-08-17T00:34:52.779" v="1" actId="2696"/>
-        <pc:sldMkLst>
-          <pc:docMk/>
-          <pc:sldMk cId="3034044073" sldId="300"/>
-        </pc:sldMkLst>
-      </pc:sldChg>
-      <pc:sldChg chg="del">
-        <pc:chgData name="Luciano Pereira Soares" userId="16c53e34-c952-423e-8700-c0525d23304f" providerId="ADAL" clId="{21D76053-4FC2-8046-8E35-708C3EA86774}" dt="2022-08-17T00:34:52.779" v="1" actId="2696"/>
-        <pc:sldMkLst>
-          <pc:docMk/>
-          <pc:sldMk cId="3269634474" sldId="301"/>
-        </pc:sldMkLst>
-      </pc:sldChg>
-      <pc:sldChg chg="del">
-        <pc:chgData name="Luciano Pereira Soares" userId="16c53e34-c952-423e-8700-c0525d23304f" providerId="ADAL" clId="{21D76053-4FC2-8046-8E35-708C3EA86774}" dt="2022-08-17T00:34:52.779" v="1" actId="2696"/>
-        <pc:sldMkLst>
-          <pc:docMk/>
-          <pc:sldMk cId="1573913687" sldId="302"/>
-        </pc:sldMkLst>
-      </pc:sldChg>
-      <pc:sldChg chg="del">
-        <pc:chgData name="Luciano Pereira Soares" userId="16c53e34-c952-423e-8700-c0525d23304f" providerId="ADAL" clId="{21D76053-4FC2-8046-8E35-708C3EA86774}" dt="2022-08-17T00:34:52.779" v="1" actId="2696"/>
-        <pc:sldMkLst>
-          <pc:docMk/>
-          <pc:sldMk cId="2727212897" sldId="303"/>
-        </pc:sldMkLst>
-      </pc:sldChg>
-      <pc:sldChg chg="del">
-        <pc:chgData name="Luciano Pereira Soares" userId="16c53e34-c952-423e-8700-c0525d23304f" providerId="ADAL" clId="{21D76053-4FC2-8046-8E35-708C3EA86774}" dt="2022-08-17T00:34:52.779" v="1" actId="2696"/>
-        <pc:sldMkLst>
-          <pc:docMk/>
-          <pc:sldMk cId="3251471121" sldId="304"/>
-        </pc:sldMkLst>
-      </pc:sldChg>
-      <pc:sldChg chg="del">
-        <pc:chgData name="Luciano Pereira Soares" userId="16c53e34-c952-423e-8700-c0525d23304f" providerId="ADAL" clId="{21D76053-4FC2-8046-8E35-708C3EA86774}" dt="2022-08-17T00:34:52.779" v="1" actId="2696"/>
-        <pc:sldMkLst>
-          <pc:docMk/>
-          <pc:sldMk cId="453157801" sldId="305"/>
-        </pc:sldMkLst>
-      </pc:sldChg>
-      <pc:sldChg chg="del">
-        <pc:chgData name="Luciano Pereira Soares" userId="16c53e34-c952-423e-8700-c0525d23304f" providerId="ADAL" clId="{21D76053-4FC2-8046-8E35-708C3EA86774}" dt="2022-08-17T00:34:52.779" v="1" actId="2696"/>
-        <pc:sldMkLst>
-          <pc:docMk/>
-          <pc:sldMk cId="1951566873" sldId="306"/>
-        </pc:sldMkLst>
-      </pc:sldChg>
-      <pc:sldChg chg="del">
-        <pc:chgData name="Luciano Pereira Soares" userId="16c53e34-c952-423e-8700-c0525d23304f" providerId="ADAL" clId="{21D76053-4FC2-8046-8E35-708C3EA86774}" dt="2022-08-17T00:34:52.779" v="1" actId="2696"/>
-        <pc:sldMkLst>
-          <pc:docMk/>
-          <pc:sldMk cId="3878185438" sldId="307"/>
-        </pc:sldMkLst>
-      </pc:sldChg>
-      <pc:sldChg chg="del">
-        <pc:chgData name="Luciano Pereira Soares" userId="16c53e34-c952-423e-8700-c0525d23304f" providerId="ADAL" clId="{21D76053-4FC2-8046-8E35-708C3EA86774}" dt="2022-08-17T00:34:52.779" v="1" actId="2696"/>
-        <pc:sldMkLst>
-          <pc:docMk/>
-          <pc:sldMk cId="3833048560" sldId="308"/>
-        </pc:sldMkLst>
-      </pc:sldChg>
-      <pc:sldChg chg="del">
-        <pc:chgData name="Luciano Pereira Soares" userId="16c53e34-c952-423e-8700-c0525d23304f" providerId="ADAL" clId="{21D76053-4FC2-8046-8E35-708C3EA86774}" dt="2022-08-17T00:34:52.779" v="1" actId="2696"/>
-        <pc:sldMkLst>
-          <pc:docMk/>
-          <pc:sldMk cId="4192908236" sldId="309"/>
-        </pc:sldMkLst>
-      </pc:sldChg>
-      <pc:sldChg chg="del">
-        <pc:chgData name="Luciano Pereira Soares" userId="16c53e34-c952-423e-8700-c0525d23304f" providerId="ADAL" clId="{21D76053-4FC2-8046-8E35-708C3EA86774}" dt="2022-08-17T00:34:52.779" v="1" actId="2696"/>
-        <pc:sldMkLst>
-          <pc:docMk/>
-          <pc:sldMk cId="2450581019" sldId="311"/>
-        </pc:sldMkLst>
-      </pc:sldChg>
-      <pc:sldChg chg="del">
-        <pc:chgData name="Luciano Pereira Soares" userId="16c53e34-c952-423e-8700-c0525d23304f" providerId="ADAL" clId="{21D76053-4FC2-8046-8E35-708C3EA86774}" dt="2022-08-17T00:34:52.779" v="1" actId="2696"/>
-        <pc:sldMkLst>
-          <pc:docMk/>
-          <pc:sldMk cId="2608316626" sldId="312"/>
-        </pc:sldMkLst>
-      </pc:sldChg>
-      <pc:sldChg chg="del">
-        <pc:chgData name="Luciano Pereira Soares" userId="16c53e34-c952-423e-8700-c0525d23304f" providerId="ADAL" clId="{21D76053-4FC2-8046-8E35-708C3EA86774}" dt="2022-08-17T00:34:52.779" v="1" actId="2696"/>
-        <pc:sldMkLst>
-          <pc:docMk/>
-          <pc:sldMk cId="1934957580" sldId="313"/>
-        </pc:sldMkLst>
-      </pc:sldChg>
-      <pc:sldChg chg="del">
-        <pc:chgData name="Luciano Pereira Soares" userId="16c53e34-c952-423e-8700-c0525d23304f" providerId="ADAL" clId="{21D76053-4FC2-8046-8E35-708C3EA86774}" dt="2022-08-17T00:34:52.779" v="1" actId="2696"/>
-        <pc:sldMkLst>
-          <pc:docMk/>
-          <pc:sldMk cId="2807832657" sldId="314"/>
-        </pc:sldMkLst>
-      </pc:sldChg>
-      <pc:sldChg chg="del">
-        <pc:chgData name="Luciano Pereira Soares" userId="16c53e34-c952-423e-8700-c0525d23304f" providerId="ADAL" clId="{21D76053-4FC2-8046-8E35-708C3EA86774}" dt="2022-08-17T00:34:52.779" v="1" actId="2696"/>
-        <pc:sldMkLst>
-          <pc:docMk/>
-          <pc:sldMk cId="1028870872" sldId="315"/>
-        </pc:sldMkLst>
-      </pc:sldChg>
-      <pc:sldChg chg="del">
-        <pc:chgData name="Luciano Pereira Soares" userId="16c53e34-c952-423e-8700-c0525d23304f" providerId="ADAL" clId="{21D76053-4FC2-8046-8E35-708C3EA86774}" dt="2022-08-17T00:34:52.779" v="1" actId="2696"/>
-        <pc:sldMkLst>
-          <pc:docMk/>
-          <pc:sldMk cId="1189783527" sldId="316"/>
-        </pc:sldMkLst>
-      </pc:sldChg>
-      <pc:sldChg chg="del">
-        <pc:chgData name="Luciano Pereira Soares" userId="16c53e34-c952-423e-8700-c0525d23304f" providerId="ADAL" clId="{21D76053-4FC2-8046-8E35-708C3EA86774}" dt="2022-08-17T00:34:52.779" v="1" actId="2696"/>
-        <pc:sldMkLst>
-          <pc:docMk/>
-          <pc:sldMk cId="1798049986" sldId="317"/>
-        </pc:sldMkLst>
-      </pc:sldChg>
-      <pc:sldChg chg="del">
-        <pc:chgData name="Luciano Pereira Soares" userId="16c53e34-c952-423e-8700-c0525d23304f" providerId="ADAL" clId="{21D76053-4FC2-8046-8E35-708C3EA86774}" dt="2022-08-17T00:34:52.779" v="1" actId="2696"/>
-        <pc:sldMkLst>
-          <pc:docMk/>
-          <pc:sldMk cId="1347503315" sldId="318"/>
-        </pc:sldMkLst>
-      </pc:sldChg>
-      <pc:sldChg chg="del">
-        <pc:chgData name="Luciano Pereira Soares" userId="16c53e34-c952-423e-8700-c0525d23304f" providerId="ADAL" clId="{21D76053-4FC2-8046-8E35-708C3EA86774}" dt="2022-08-17T00:34:52.779" v="1" actId="2696"/>
-        <pc:sldMkLst>
-          <pc:docMk/>
-          <pc:sldMk cId="1648801762" sldId="319"/>
-        </pc:sldMkLst>
-      </pc:sldChg>
-      <pc:sldChg chg="del">
-        <pc:chgData name="Luciano Pereira Soares" userId="16c53e34-c952-423e-8700-c0525d23304f" providerId="ADAL" clId="{21D76053-4FC2-8046-8E35-708C3EA86774}" dt="2022-08-17T00:34:52.779" v="1" actId="2696"/>
-        <pc:sldMkLst>
-          <pc:docMk/>
-          <pc:sldMk cId="3080152500" sldId="320"/>
-        </pc:sldMkLst>
-      </pc:sldChg>
-      <pc:sldChg chg="del">
-        <pc:chgData name="Luciano Pereira Soares" userId="16c53e34-c952-423e-8700-c0525d23304f" providerId="ADAL" clId="{21D76053-4FC2-8046-8E35-708C3EA86774}" dt="2022-08-17T00:34:52.779" v="1" actId="2696"/>
-        <pc:sldMkLst>
-          <pc:docMk/>
-          <pc:sldMk cId="1861366562" sldId="321"/>
-        </pc:sldMkLst>
-      </pc:sldChg>
-      <pc:sldChg chg="del">
-        <pc:chgData name="Luciano Pereira Soares" userId="16c53e34-c952-423e-8700-c0525d23304f" providerId="ADAL" clId="{21D76053-4FC2-8046-8E35-708C3EA86774}" dt="2022-08-17T00:34:52.779" v="1" actId="2696"/>
-        <pc:sldMkLst>
-          <pc:docMk/>
-          <pc:sldMk cId="380794106" sldId="322"/>
-        </pc:sldMkLst>
-      </pc:sldChg>
-      <pc:sldChg chg="del">
-        <pc:chgData name="Luciano Pereira Soares" userId="16c53e34-c952-423e-8700-c0525d23304f" providerId="ADAL" clId="{21D76053-4FC2-8046-8E35-708C3EA86774}" dt="2022-08-17T00:34:52.779" v="1" actId="2696"/>
-        <pc:sldMkLst>
-          <pc:docMk/>
-          <pc:sldMk cId="4089055669" sldId="323"/>
-        </pc:sldMkLst>
-      </pc:sldChg>
-      <pc:sldChg chg="del">
-        <pc:chgData name="Luciano Pereira Soares" userId="16c53e34-c952-423e-8700-c0525d23304f" providerId="ADAL" clId="{21D76053-4FC2-8046-8E35-708C3EA86774}" dt="2022-08-17T00:34:52.779" v="1" actId="2696"/>
-        <pc:sldMkLst>
-          <pc:docMk/>
-          <pc:sldMk cId="1832844973" sldId="324"/>
-        </pc:sldMkLst>
-      </pc:sldChg>
-      <pc:sldChg chg="del">
-        <pc:chgData name="Luciano Pereira Soares" userId="16c53e34-c952-423e-8700-c0525d23304f" providerId="ADAL" clId="{21D76053-4FC2-8046-8E35-708C3EA86774}" dt="2022-08-17T00:34:52.779" v="1" actId="2696"/>
-        <pc:sldMkLst>
-          <pc:docMk/>
-          <pc:sldMk cId="157196928" sldId="325"/>
-        </pc:sldMkLst>
-      </pc:sldChg>
-      <pc:sldChg chg="del">
-        <pc:chgData name="Luciano Pereira Soares" userId="16c53e34-c952-423e-8700-c0525d23304f" providerId="ADAL" clId="{21D76053-4FC2-8046-8E35-708C3EA86774}" dt="2022-08-17T00:34:52.779" v="1" actId="2696"/>
-        <pc:sldMkLst>
-          <pc:docMk/>
-          <pc:sldMk cId="1637131583" sldId="326"/>
-        </pc:sldMkLst>
-      </pc:sldChg>
-      <pc:sldChg chg="del">
-        <pc:chgData name="Luciano Pereira Soares" userId="16c53e34-c952-423e-8700-c0525d23304f" providerId="ADAL" clId="{21D76053-4FC2-8046-8E35-708C3EA86774}" dt="2022-08-17T00:34:52.779" v="1" actId="2696"/>
-        <pc:sldMkLst>
-          <pc:docMk/>
-          <pc:sldMk cId="3380530401" sldId="327"/>
-        </pc:sldMkLst>
-      </pc:sldChg>
-      <pc:sldChg chg="del">
-        <pc:chgData name="Luciano Pereira Soares" userId="16c53e34-c952-423e-8700-c0525d23304f" providerId="ADAL" clId="{21D76053-4FC2-8046-8E35-708C3EA86774}" dt="2022-08-17T00:34:52.779" v="1" actId="2696"/>
-        <pc:sldMkLst>
-          <pc:docMk/>
-          <pc:sldMk cId="65727687" sldId="328"/>
-        </pc:sldMkLst>
-      </pc:sldChg>
-      <pc:sldChg chg="del">
-        <pc:chgData name="Luciano Pereira Soares" userId="16c53e34-c952-423e-8700-c0525d23304f" providerId="ADAL" clId="{21D76053-4FC2-8046-8E35-708C3EA86774}" dt="2022-08-17T00:34:52.779" v="1" actId="2696"/>
-        <pc:sldMkLst>
-          <pc:docMk/>
-          <pc:sldMk cId="339457961" sldId="329"/>
-        </pc:sldMkLst>
-      </pc:sldChg>
-      <pc:sldChg chg="del">
-        <pc:chgData name="Luciano Pereira Soares" userId="16c53e34-c952-423e-8700-c0525d23304f" providerId="ADAL" clId="{21D76053-4FC2-8046-8E35-708C3EA86774}" dt="2022-08-17T00:34:52.779" v="1" actId="2696"/>
-        <pc:sldMkLst>
-          <pc:docMk/>
-          <pc:sldMk cId="520571115" sldId="330"/>
-        </pc:sldMkLst>
-      </pc:sldChg>
-      <pc:sldChg chg="del">
-        <pc:chgData name="Luciano Pereira Soares" userId="16c53e34-c952-423e-8700-c0525d23304f" providerId="ADAL" clId="{21D76053-4FC2-8046-8E35-708C3EA86774}" dt="2022-08-17T00:34:52.779" v="1" actId="2696"/>
-        <pc:sldMkLst>
-          <pc:docMk/>
-          <pc:sldMk cId="2164295974" sldId="331"/>
-        </pc:sldMkLst>
-      </pc:sldChg>
-      <pc:sldChg chg="del">
-        <pc:chgData name="Luciano Pereira Soares" userId="16c53e34-c952-423e-8700-c0525d23304f" providerId="ADAL" clId="{21D76053-4FC2-8046-8E35-708C3EA86774}" dt="2022-08-17T00:34:52.779" v="1" actId="2696"/>
-        <pc:sldMkLst>
-          <pc:docMk/>
-          <pc:sldMk cId="771695050" sldId="332"/>
-        </pc:sldMkLst>
-      </pc:sldChg>
-      <pc:sldChg chg="del">
-        <pc:chgData name="Luciano Pereira Soares" userId="16c53e34-c952-423e-8700-c0525d23304f" providerId="ADAL" clId="{21D76053-4FC2-8046-8E35-708C3EA86774}" dt="2022-08-17T00:34:52.779" v="1" actId="2696"/>
-        <pc:sldMkLst>
-          <pc:docMk/>
-          <pc:sldMk cId="3585071933" sldId="333"/>
-        </pc:sldMkLst>
-      </pc:sldChg>
-      <pc:sldChg chg="del">
-        <pc:chgData name="Luciano Pereira Soares" userId="16c53e34-c952-423e-8700-c0525d23304f" providerId="ADAL" clId="{21D76053-4FC2-8046-8E35-708C3EA86774}" dt="2022-08-17T00:34:52.779" v="1" actId="2696"/>
-        <pc:sldMkLst>
-          <pc:docMk/>
-          <pc:sldMk cId="1416409760" sldId="334"/>
-        </pc:sldMkLst>
-      </pc:sldChg>
-      <pc:sldChg chg="del">
-        <pc:chgData name="Luciano Pereira Soares" userId="16c53e34-c952-423e-8700-c0525d23304f" providerId="ADAL" clId="{21D76053-4FC2-8046-8E35-708C3EA86774}" dt="2022-08-17T00:34:52.779" v="1" actId="2696"/>
-        <pc:sldMkLst>
-          <pc:docMk/>
-          <pc:sldMk cId="2257655667" sldId="335"/>
-        </pc:sldMkLst>
-      </pc:sldChg>
-      <pc:sldChg chg="del">
-        <pc:chgData name="Luciano Pereira Soares" userId="16c53e34-c952-423e-8700-c0525d23304f" providerId="ADAL" clId="{21D76053-4FC2-8046-8E35-708C3EA86774}" dt="2022-08-17T00:34:52.779" v="1" actId="2696"/>
-        <pc:sldMkLst>
-          <pc:docMk/>
-          <pc:sldMk cId="3672068477" sldId="336"/>
-        </pc:sldMkLst>
-      </pc:sldChg>
-      <pc:sldChg chg="del">
-        <pc:chgData name="Luciano Pereira Soares" userId="16c53e34-c952-423e-8700-c0525d23304f" providerId="ADAL" clId="{21D76053-4FC2-8046-8E35-708C3EA86774}" dt="2022-08-17T00:34:52.779" v="1" actId="2696"/>
-        <pc:sldMkLst>
-          <pc:docMk/>
-          <pc:sldMk cId="2246476944" sldId="337"/>
-        </pc:sldMkLst>
-      </pc:sldChg>
-      <pc:sldChg chg="del">
-        <pc:chgData name="Luciano Pereira Soares" userId="16c53e34-c952-423e-8700-c0525d23304f" providerId="ADAL" clId="{21D76053-4FC2-8046-8E35-708C3EA86774}" dt="2022-08-17T00:34:52.779" v="1" actId="2696"/>
-        <pc:sldMkLst>
-          <pc:docMk/>
-          <pc:sldMk cId="96632061" sldId="356"/>
-        </pc:sldMkLst>
-      </pc:sldChg>
-      <pc:sldChg chg="del">
-        <pc:chgData name="Luciano Pereira Soares" userId="16c53e34-c952-423e-8700-c0525d23304f" providerId="ADAL" clId="{21D76053-4FC2-8046-8E35-708C3EA86774}" dt="2022-08-17T00:34:52.779" v="1" actId="2696"/>
-        <pc:sldMkLst>
-          <pc:docMk/>
-          <pc:sldMk cId="810874321" sldId="357"/>
-        </pc:sldMkLst>
-      </pc:sldChg>
-      <pc:sldChg chg="del">
-        <pc:chgData name="Luciano Pereira Soares" userId="16c53e34-c952-423e-8700-c0525d23304f" providerId="ADAL" clId="{21D76053-4FC2-8046-8E35-708C3EA86774}" dt="2022-08-17T00:34:52.779" v="1" actId="2696"/>
-        <pc:sldMkLst>
-          <pc:docMk/>
-          <pc:sldMk cId="372318287" sldId="554"/>
-        </pc:sldMkLst>
-      </pc:sldChg>
-      <pc:sldChg chg="del">
-        <pc:chgData name="Luciano Pereira Soares" userId="16c53e34-c952-423e-8700-c0525d23304f" providerId="ADAL" clId="{21D76053-4FC2-8046-8E35-708C3EA86774}" dt="2022-08-17T00:34:52.779" v="1" actId="2696"/>
-        <pc:sldMkLst>
-          <pc:docMk/>
-          <pc:sldMk cId="3155441199" sldId="555"/>
-        </pc:sldMkLst>
       </pc:sldChg>
     </pc:docChg>
   </pc:docChgLst>
@@ -6833,7 +6833,12 @@
             <p:ph type="body" sz="quarter" idx="11"/>
           </p:nvPr>
         </p:nvSpPr>
-        <p:spPr/>
+        <p:spPr>
+          <a:xfrm>
+            <a:off x="3596231" y="1203159"/>
+            <a:ext cx="5403389" cy="3325980"/>
+          </a:xfrm>
+        </p:spPr>
         <p:txBody>
           <a:bodyPr/>
           <a:lstStyle/>
@@ -6850,6 +6855,9 @@
               <a:rPr lang="pt-BR" dirty="0"/>
               <a:t>é normalmente a primeira ideia para resolver problemas computacionais</a:t>
             </a:r>
+          </a:p>
+          <a:p>
+            <a:endParaRPr lang="pt-BR" dirty="0"/>
           </a:p>
           <a:p>
             <a:r>
@@ -7003,211 +7011,10 @@
             <p:ph type="title"/>
           </p:nvPr>
         </p:nvSpPr>
-        <p:spPr/>
-        <p:txBody>
-          <a:bodyPr/>
-          <a:lstStyle/>
-          <a:p>
-            <a:r>
-              <a:rPr lang="pt-BR" dirty="0"/>
-              <a:t>Busca exaustiva na mochila</a:t>
-            </a:r>
-          </a:p>
-        </p:txBody>
-      </p:sp>
-      <p:pic>
-        <p:nvPicPr>
-          <p:cNvPr id="6" name="Espaço Reservado para Imagem 5" descr="Forma, Calendário, Círculo&#10;&#10;Descrição gerada automaticamente">
-            <a:extLst>
-              <a:ext uri="{FF2B5EF4-FFF2-40B4-BE49-F238E27FC236}">
-                <a16:creationId xmlns:a16="http://schemas.microsoft.com/office/drawing/2014/main" id="{BCBEE721-11DA-754A-9982-ECE2A09EB3EE}"/>
-              </a:ext>
-            </a:extLst>
-          </p:cNvPr>
-          <p:cNvPicPr>
-            <a:picLocks noGrp="1" noChangeAspect="1"/>
-          </p:cNvPicPr>
-          <p:nvPr>
-            <p:ph type="pic" sz="quarter" idx="10"/>
-          </p:nvPr>
-        </p:nvPicPr>
-        <p:blipFill>
-          <a:blip r:embed="rId2" cstate="screen">
-            <a:extLst>
-              <a:ext uri="{28A0092B-C50C-407E-A947-70E740481C1C}">
-                <a14:useLocalDpi xmlns:a14="http://schemas.microsoft.com/office/drawing/2010/main"/>
-              </a:ext>
-              <a:ext uri="{837473B0-CC2E-450A-ABE3-18F120FF3D39}">
-                <a1611:picAttrSrcUrl xmlns:a1611="http://schemas.microsoft.com/office/drawing/2016/11/main" r:id="rId3"/>
-              </a:ext>
-            </a:extLst>
-          </a:blip>
-          <a:srcRect/>
-          <a:stretch>
-            <a:fillRect/>
-          </a:stretch>
-        </p:blipFill>
-        <p:spPr/>
-      </p:pic>
-      <p:sp>
-        <p:nvSpPr>
-          <p:cNvPr id="4" name="Espaço Reservado para Texto 3">
-            <a:extLst>
-              <a:ext uri="{FF2B5EF4-FFF2-40B4-BE49-F238E27FC236}">
-                <a16:creationId xmlns:a16="http://schemas.microsoft.com/office/drawing/2014/main" id="{1C04FEA0-CAB9-7D4D-A063-B8F0835412A1}"/>
-              </a:ext>
-            </a:extLst>
-          </p:cNvPr>
-          <p:cNvSpPr>
-            <a:spLocks noGrp="1"/>
-          </p:cNvSpPr>
-          <p:nvPr>
-            <p:ph type="body" sz="quarter" idx="11"/>
-          </p:nvPr>
-        </p:nvSpPr>
-        <p:spPr/>
-        <p:txBody>
-          <a:bodyPr/>
-          <a:lstStyle/>
-          <a:p>
-            <a:r>
-              <a:rPr lang="pt-BR" dirty="0"/>
-              <a:t>Imagine uma mochila com capacidade 16 e 4 itens:</a:t>
-            </a:r>
-          </a:p>
-        </p:txBody>
-      </p:sp>
-      <p:sp>
-        <p:nvSpPr>
-          <p:cNvPr id="7" name="CaixaDeTexto 6">
-            <a:extLst>
-              <a:ext uri="{FF2B5EF4-FFF2-40B4-BE49-F238E27FC236}">
-                <a16:creationId xmlns:a16="http://schemas.microsoft.com/office/drawing/2014/main" id="{26722F12-4E1F-034B-8462-5BBDD334CDBD}"/>
-              </a:ext>
-            </a:extLst>
-          </p:cNvPr>
-          <p:cNvSpPr txBox="1"/>
-          <p:nvPr/>
-        </p:nvSpPr>
         <p:spPr>
           <a:xfrm>
-            <a:off x="0" y="5148263"/>
-            <a:ext cx="3369165" cy="230832"/>
-          </a:xfrm>
-          <a:prstGeom prst="rect">
-            <a:avLst/>
-          </a:prstGeom>
-          <a:noFill/>
-        </p:spPr>
-        <p:txBody>
-          <a:bodyPr wrap="square" rtlCol="0">
-            <a:spAutoFit/>
-          </a:bodyPr>
-          <a:lstStyle/>
-          <a:p>
-            <a:r>
-              <a:rPr lang="pt-BR" sz="900">
-                <a:hlinkClick r:id="rId3" tooltip="http://thefilecabinet.blogspot.com/2012/02/ending-up-with-extra-parts.html"/>
-              </a:rPr>
-              <a:t>Esta Foto</a:t>
-            </a:r>
-            <a:r>
-              <a:rPr lang="pt-BR" sz="900"/>
-              <a:t> de Autor Desconhecido está licenciado em </a:t>
-            </a:r>
-            <a:r>
-              <a:rPr lang="pt-BR" sz="900">
-                <a:hlinkClick r:id="rId4" tooltip="https://creativecommons.org/licenses/by/3.0/"/>
-              </a:rPr>
-              <a:t>CC BY</a:t>
-            </a:r>
-            <a:endParaRPr lang="pt-BR" sz="900"/>
-          </a:p>
-        </p:txBody>
-      </p:sp>
-      <p:pic>
-        <p:nvPicPr>
-          <p:cNvPr id="8" name="Imagem 7">
-            <a:extLst>
-              <a:ext uri="{FF2B5EF4-FFF2-40B4-BE49-F238E27FC236}">
-                <a16:creationId xmlns:a16="http://schemas.microsoft.com/office/drawing/2014/main" id="{E77425F5-C4DB-A84E-8D6E-408BC4E91157}"/>
-              </a:ext>
-            </a:extLst>
-          </p:cNvPr>
-          <p:cNvPicPr>
-            <a:picLocks noChangeAspect="1"/>
-          </p:cNvPicPr>
-          <p:nvPr/>
-        </p:nvPicPr>
-        <p:blipFill>
-          <a:blip r:embed="rId5"/>
-          <a:stretch>
-            <a:fillRect/>
-          </a:stretch>
-        </p:blipFill>
-        <p:spPr>
-          <a:xfrm>
-            <a:off x="4714953" y="2571750"/>
-            <a:ext cx="3416300" cy="2044700"/>
-          </a:xfrm>
-          <a:prstGeom prst="rect">
-            <a:avLst/>
-          </a:prstGeom>
-        </p:spPr>
-      </p:pic>
-    </p:spTree>
-    <p:extLst>
-      <p:ext uri="{BB962C8B-B14F-4D97-AF65-F5344CB8AC3E}">
-        <p14:creationId xmlns:p14="http://schemas.microsoft.com/office/powerpoint/2010/main" val="3378276685"/>
-      </p:ext>
-    </p:extLst>
-  </p:cSld>
-  <p:clrMapOvr>
-    <a:masterClrMapping/>
-  </p:clrMapOvr>
-  <p:transition>
-    <p:fade/>
-  </p:transition>
-</p:sld>
-</file>
-
-<file path=ppt/slides/slide5.xml><?xml version="1.0" encoding="utf-8"?>
-<p:sld xmlns:a="http://schemas.openxmlformats.org/drawingml/2006/main" xmlns:r="http://schemas.openxmlformats.org/officeDocument/2006/relationships" xmlns:p="http://schemas.openxmlformats.org/presentationml/2006/main">
-  <p:cSld>
-    <p:spTree>
-      <p:nvGrpSpPr>
-        <p:cNvPr id="1" name=""/>
-        <p:cNvGrpSpPr/>
-        <p:nvPr/>
-      </p:nvGrpSpPr>
-      <p:grpSpPr>
-        <a:xfrm>
-          <a:off x="0" y="0"/>
-          <a:ext cx="0" cy="0"/>
-          <a:chOff x="0" y="0"/>
-          <a:chExt cx="0" cy="0"/>
-        </a:xfrm>
-      </p:grpSpPr>
-      <p:sp>
-        <p:nvSpPr>
-          <p:cNvPr id="2" name="Título 1">
-            <a:extLst>
-              <a:ext uri="{FF2B5EF4-FFF2-40B4-BE49-F238E27FC236}">
-                <a16:creationId xmlns:a16="http://schemas.microsoft.com/office/drawing/2014/main" id="{C196D129-3E9F-5049-83BE-514501B1ABE4}"/>
-              </a:ext>
-            </a:extLst>
-          </p:cNvPr>
-          <p:cNvSpPr>
-            <a:spLocks noGrp="1"/>
-          </p:cNvSpPr>
-          <p:nvPr>
-            <p:ph type="title"/>
-          </p:nvPr>
-        </p:nvSpPr>
-        <p:spPr>
-          <a:xfrm>
-            <a:off x="3596231" y="41662"/>
-            <a:ext cx="5236068" cy="572700"/>
+            <a:off x="3596232" y="445025"/>
+            <a:ext cx="5547768" cy="572700"/>
           </a:xfrm>
         </p:spPr>
         <p:txBody>
@@ -7273,7 +7080,490 @@
         </p:nvSpPr>
         <p:spPr>
           <a:xfrm>
-            <a:off x="3596231" y="1055687"/>
+            <a:off x="3596232" y="1055687"/>
+            <a:ext cx="5236068" cy="3032125"/>
+          </a:xfrm>
+        </p:spPr>
+        <p:txBody>
+          <a:bodyPr/>
+          <a:lstStyle/>
+          <a:p>
+            <a:r>
+              <a:rPr lang="pt-BR" dirty="0"/>
+              <a:t>Imagine uma mochila com capacidade 16 e 4 itens:</a:t>
+            </a:r>
+          </a:p>
+        </p:txBody>
+      </p:sp>
+      <p:sp>
+        <p:nvSpPr>
+          <p:cNvPr id="7" name="CaixaDeTexto 6">
+            <a:extLst>
+              <a:ext uri="{FF2B5EF4-FFF2-40B4-BE49-F238E27FC236}">
+                <a16:creationId xmlns:a16="http://schemas.microsoft.com/office/drawing/2014/main" id="{26722F12-4E1F-034B-8462-5BBDD334CDBD}"/>
+              </a:ext>
+            </a:extLst>
+          </p:cNvPr>
+          <p:cNvSpPr txBox="1"/>
+          <p:nvPr/>
+        </p:nvSpPr>
+        <p:spPr>
+          <a:xfrm>
+            <a:off x="0" y="5148263"/>
+            <a:ext cx="3369165" cy="230832"/>
+          </a:xfrm>
+          <a:prstGeom prst="rect">
+            <a:avLst/>
+          </a:prstGeom>
+          <a:noFill/>
+        </p:spPr>
+        <p:txBody>
+          <a:bodyPr wrap="square" rtlCol="0">
+            <a:spAutoFit/>
+          </a:bodyPr>
+          <a:lstStyle/>
+          <a:p>
+            <a:r>
+              <a:rPr lang="pt-BR" sz="900">
+                <a:hlinkClick r:id="rId3" tooltip="http://thefilecabinet.blogspot.com/2012/02/ending-up-with-extra-parts.html"/>
+              </a:rPr>
+              <a:t>Esta Foto</a:t>
+            </a:r>
+            <a:r>
+              <a:rPr lang="pt-BR" sz="900"/>
+              <a:t> de Autor Desconhecido está licenciado em </a:t>
+            </a:r>
+            <a:r>
+              <a:rPr lang="pt-BR" sz="900">
+                <a:hlinkClick r:id="rId4" tooltip="https://creativecommons.org/licenses/by/3.0/"/>
+              </a:rPr>
+              <a:t>CC BY</a:t>
+            </a:r>
+            <a:endParaRPr lang="pt-BR" sz="900"/>
+          </a:p>
+        </p:txBody>
+      </p:sp>
+      <p:graphicFrame>
+        <p:nvGraphicFramePr>
+          <p:cNvPr id="3" name="Table 4">
+            <a:extLst>
+              <a:ext uri="{FF2B5EF4-FFF2-40B4-BE49-F238E27FC236}">
+                <a16:creationId xmlns:a16="http://schemas.microsoft.com/office/drawing/2014/main" id="{C5961EF0-34F1-0FEF-3AD9-752A3CA3411F}"/>
+              </a:ext>
+            </a:extLst>
+          </p:cNvPr>
+          <p:cNvGraphicFramePr>
+            <a:graphicFrameLocks noGrp="1"/>
+          </p:cNvGraphicFramePr>
+          <p:nvPr>
+            <p:extLst>
+              <p:ext uri="{D42A27DB-BD31-4B8C-83A1-F6EECF244321}">
+                <p14:modId xmlns:p14="http://schemas.microsoft.com/office/powerpoint/2010/main" val="1939441676"/>
+              </p:ext>
+            </p:extLst>
+          </p:nvPr>
+        </p:nvGraphicFramePr>
+        <p:xfrm>
+          <a:off x="4658336" y="2006074"/>
+          <a:ext cx="3604182" cy="2590800"/>
+        </p:xfrm>
+        <a:graphic>
+          <a:graphicData uri="http://schemas.openxmlformats.org/drawingml/2006/table">
+            <a:tbl>
+              <a:tblPr firstRow="1">
+                <a:tableStyleId>{9D7B26C5-4107-4FEC-AEDC-1716B250A1EF}</a:tableStyleId>
+              </a:tblPr>
+              <a:tblGrid>
+                <a:gridCol w="1201394">
+                  <a:extLst>
+                    <a:ext uri="{9D8B030D-6E8A-4147-A177-3AD203B41FA5}">
+                      <a16:colId xmlns:a16="http://schemas.microsoft.com/office/drawing/2014/main" val="3809258294"/>
+                    </a:ext>
+                  </a:extLst>
+                </a:gridCol>
+                <a:gridCol w="1201394">
+                  <a:extLst>
+                    <a:ext uri="{9D8B030D-6E8A-4147-A177-3AD203B41FA5}">
+                      <a16:colId xmlns:a16="http://schemas.microsoft.com/office/drawing/2014/main" val="3757951994"/>
+                    </a:ext>
+                  </a:extLst>
+                </a:gridCol>
+                <a:gridCol w="1201394">
+                  <a:extLst>
+                    <a:ext uri="{9D8B030D-6E8A-4147-A177-3AD203B41FA5}">
+                      <a16:colId xmlns:a16="http://schemas.microsoft.com/office/drawing/2014/main" val="1970167585"/>
+                    </a:ext>
+                  </a:extLst>
+                </a:gridCol>
+              </a:tblGrid>
+              <a:tr h="370840">
+                <a:tc>
+                  <a:txBody>
+                    <a:bodyPr/>
+                    <a:lstStyle/>
+                    <a:p>
+                      <a:pPr algn="ctr"/>
+                      <a:r>
+                        <a:rPr lang="en-BR" sz="2800" dirty="0"/>
+                        <a:t>item</a:t>
+                      </a:r>
+                    </a:p>
+                  </a:txBody>
+                  <a:tcPr/>
+                </a:tc>
+                <a:tc>
+                  <a:txBody>
+                    <a:bodyPr/>
+                    <a:lstStyle/>
+                    <a:p>
+                      <a:pPr algn="ctr"/>
+                      <a:r>
+                        <a:rPr lang="en-BR" sz="2800" dirty="0"/>
+                        <a:t>peso</a:t>
+                      </a:r>
+                    </a:p>
+                  </a:txBody>
+                  <a:tcPr/>
+                </a:tc>
+                <a:tc>
+                  <a:txBody>
+                    <a:bodyPr/>
+                    <a:lstStyle/>
+                    <a:p>
+                      <a:pPr algn="ctr"/>
+                      <a:r>
+                        <a:rPr lang="en-BR" sz="2800" dirty="0"/>
+                        <a:t>valor</a:t>
+                      </a:r>
+                    </a:p>
+                  </a:txBody>
+                  <a:tcPr/>
+                </a:tc>
+                <a:extLst>
+                  <a:ext uri="{0D108BD9-81ED-4DB2-BD59-A6C34878D82A}">
+                    <a16:rowId xmlns:a16="http://schemas.microsoft.com/office/drawing/2014/main" val="1495222055"/>
+                  </a:ext>
+                </a:extLst>
+              </a:tr>
+              <a:tr h="370840">
+                <a:tc>
+                  <a:txBody>
+                    <a:bodyPr/>
+                    <a:lstStyle/>
+                    <a:p>
+                      <a:pPr algn="ctr"/>
+                      <a:r>
+                        <a:rPr lang="en-BR" sz="2800" dirty="0"/>
+                        <a:t>1</a:t>
+                      </a:r>
+                    </a:p>
+                  </a:txBody>
+                  <a:tcPr/>
+                </a:tc>
+                <a:tc>
+                  <a:txBody>
+                    <a:bodyPr/>
+                    <a:lstStyle/>
+                    <a:p>
+                      <a:pPr algn="ctr"/>
+                      <a:r>
+                        <a:rPr lang="en-BR" sz="2800" dirty="0"/>
+                        <a:t>2</a:t>
+                      </a:r>
+                    </a:p>
+                  </a:txBody>
+                  <a:tcPr/>
+                </a:tc>
+                <a:tc>
+                  <a:txBody>
+                    <a:bodyPr/>
+                    <a:lstStyle/>
+                    <a:p>
+                      <a:pPr algn="ctr"/>
+                      <a:r>
+                        <a:rPr lang="en-BR" sz="2800" dirty="0"/>
+                        <a:t>$20</a:t>
+                      </a:r>
+                    </a:p>
+                  </a:txBody>
+                  <a:tcPr/>
+                </a:tc>
+                <a:extLst>
+                  <a:ext uri="{0D108BD9-81ED-4DB2-BD59-A6C34878D82A}">
+                    <a16:rowId xmlns:a16="http://schemas.microsoft.com/office/drawing/2014/main" val="3480083286"/>
+                  </a:ext>
+                </a:extLst>
+              </a:tr>
+              <a:tr h="370840">
+                <a:tc>
+                  <a:txBody>
+                    <a:bodyPr/>
+                    <a:lstStyle/>
+                    <a:p>
+                      <a:pPr algn="ctr"/>
+                      <a:r>
+                        <a:rPr lang="en-BR" sz="2800" dirty="0"/>
+                        <a:t>2</a:t>
+                      </a:r>
+                    </a:p>
+                  </a:txBody>
+                  <a:tcPr/>
+                </a:tc>
+                <a:tc>
+                  <a:txBody>
+                    <a:bodyPr/>
+                    <a:lstStyle/>
+                    <a:p>
+                      <a:pPr algn="ctr"/>
+                      <a:r>
+                        <a:rPr lang="en-BR" sz="2800" dirty="0"/>
+                        <a:t>5</a:t>
+                      </a:r>
+                    </a:p>
+                  </a:txBody>
+                  <a:tcPr/>
+                </a:tc>
+                <a:tc>
+                  <a:txBody>
+                    <a:bodyPr/>
+                    <a:lstStyle/>
+                    <a:p>
+                      <a:pPr algn="ctr"/>
+                      <a:r>
+                        <a:rPr lang="en-BR" sz="2800" dirty="0"/>
+                        <a:t>$30</a:t>
+                      </a:r>
+                    </a:p>
+                  </a:txBody>
+                  <a:tcPr/>
+                </a:tc>
+                <a:extLst>
+                  <a:ext uri="{0D108BD9-81ED-4DB2-BD59-A6C34878D82A}">
+                    <a16:rowId xmlns:a16="http://schemas.microsoft.com/office/drawing/2014/main" val="3498475793"/>
+                  </a:ext>
+                </a:extLst>
+              </a:tr>
+              <a:tr h="370840">
+                <a:tc>
+                  <a:txBody>
+                    <a:bodyPr/>
+                    <a:lstStyle/>
+                    <a:p>
+                      <a:pPr algn="ctr"/>
+                      <a:r>
+                        <a:rPr lang="en-BR" sz="2800" dirty="0"/>
+                        <a:t>3</a:t>
+                      </a:r>
+                    </a:p>
+                  </a:txBody>
+                  <a:tcPr/>
+                </a:tc>
+                <a:tc>
+                  <a:txBody>
+                    <a:bodyPr/>
+                    <a:lstStyle/>
+                    <a:p>
+                      <a:pPr algn="ctr"/>
+                      <a:r>
+                        <a:rPr lang="en-BR" sz="2800" dirty="0"/>
+                        <a:t>10</a:t>
+                      </a:r>
+                    </a:p>
+                  </a:txBody>
+                  <a:tcPr/>
+                </a:tc>
+                <a:tc>
+                  <a:txBody>
+                    <a:bodyPr/>
+                    <a:lstStyle/>
+                    <a:p>
+                      <a:pPr algn="ctr"/>
+                      <a:r>
+                        <a:rPr lang="en-BR" sz="2800" dirty="0"/>
+                        <a:t>$50</a:t>
+                      </a:r>
+                    </a:p>
+                  </a:txBody>
+                  <a:tcPr/>
+                </a:tc>
+                <a:extLst>
+                  <a:ext uri="{0D108BD9-81ED-4DB2-BD59-A6C34878D82A}">
+                    <a16:rowId xmlns:a16="http://schemas.microsoft.com/office/drawing/2014/main" val="2239246318"/>
+                  </a:ext>
+                </a:extLst>
+              </a:tr>
+              <a:tr h="370840">
+                <a:tc>
+                  <a:txBody>
+                    <a:bodyPr/>
+                    <a:lstStyle/>
+                    <a:p>
+                      <a:pPr algn="ctr"/>
+                      <a:r>
+                        <a:rPr lang="en-BR" sz="2800" dirty="0"/>
+                        <a:t>4</a:t>
+                      </a:r>
+                    </a:p>
+                  </a:txBody>
+                  <a:tcPr/>
+                </a:tc>
+                <a:tc>
+                  <a:txBody>
+                    <a:bodyPr/>
+                    <a:lstStyle/>
+                    <a:p>
+                      <a:pPr algn="ctr"/>
+                      <a:r>
+                        <a:rPr lang="en-BR" sz="2800" dirty="0"/>
+                        <a:t>5</a:t>
+                      </a:r>
+                    </a:p>
+                  </a:txBody>
+                  <a:tcPr/>
+                </a:tc>
+                <a:tc>
+                  <a:txBody>
+                    <a:bodyPr/>
+                    <a:lstStyle/>
+                    <a:p>
+                      <a:pPr algn="ctr"/>
+                      <a:r>
+                        <a:rPr lang="en-BR" sz="2800" dirty="0"/>
+                        <a:t>$10</a:t>
+                      </a:r>
+                    </a:p>
+                  </a:txBody>
+                  <a:tcPr/>
+                </a:tc>
+                <a:extLst>
+                  <a:ext uri="{0D108BD9-81ED-4DB2-BD59-A6C34878D82A}">
+                    <a16:rowId xmlns:a16="http://schemas.microsoft.com/office/drawing/2014/main" val="2009142925"/>
+                  </a:ext>
+                </a:extLst>
+              </a:tr>
+            </a:tbl>
+          </a:graphicData>
+        </a:graphic>
+      </p:graphicFrame>
+    </p:spTree>
+    <p:extLst>
+      <p:ext uri="{BB962C8B-B14F-4D97-AF65-F5344CB8AC3E}">
+        <p14:creationId xmlns:p14="http://schemas.microsoft.com/office/powerpoint/2010/main" val="3378276685"/>
+      </p:ext>
+    </p:extLst>
+  </p:cSld>
+  <p:clrMapOvr>
+    <a:masterClrMapping/>
+  </p:clrMapOvr>
+  <p:transition>
+    <p:fade/>
+  </p:transition>
+</p:sld>
+</file>
+
+<file path=ppt/slides/slide5.xml><?xml version="1.0" encoding="utf-8"?>
+<p:sld xmlns:a="http://schemas.openxmlformats.org/drawingml/2006/main" xmlns:r="http://schemas.openxmlformats.org/officeDocument/2006/relationships" xmlns:p="http://schemas.openxmlformats.org/presentationml/2006/main">
+  <p:cSld>
+    <p:spTree>
+      <p:nvGrpSpPr>
+        <p:cNvPr id="1" name=""/>
+        <p:cNvGrpSpPr/>
+        <p:nvPr/>
+      </p:nvGrpSpPr>
+      <p:grpSpPr>
+        <a:xfrm>
+          <a:off x="0" y="0"/>
+          <a:ext cx="0" cy="0"/>
+          <a:chOff x="0" y="0"/>
+          <a:chExt cx="0" cy="0"/>
+        </a:xfrm>
+      </p:grpSpPr>
+      <p:sp>
+        <p:nvSpPr>
+          <p:cNvPr id="2" name="Título 1">
+            <a:extLst>
+              <a:ext uri="{FF2B5EF4-FFF2-40B4-BE49-F238E27FC236}">
+                <a16:creationId xmlns:a16="http://schemas.microsoft.com/office/drawing/2014/main" id="{C196D129-3E9F-5049-83BE-514501B1ABE4}"/>
+              </a:ext>
+            </a:extLst>
+          </p:cNvPr>
+          <p:cNvSpPr>
+            <a:spLocks noGrp="1"/>
+          </p:cNvSpPr>
+          <p:nvPr>
+            <p:ph type="title"/>
+          </p:nvPr>
+        </p:nvSpPr>
+        <p:spPr>
+          <a:xfrm>
+            <a:off x="3596230" y="41662"/>
+            <a:ext cx="5547769" cy="572700"/>
+          </a:xfrm>
+        </p:spPr>
+        <p:txBody>
+          <a:bodyPr/>
+          <a:lstStyle/>
+          <a:p>
+            <a:r>
+              <a:rPr lang="pt-BR" dirty="0"/>
+              <a:t>Busca exaustiva na mochila</a:t>
+            </a:r>
+          </a:p>
+        </p:txBody>
+      </p:sp>
+      <p:pic>
+        <p:nvPicPr>
+          <p:cNvPr id="6" name="Espaço Reservado para Imagem 5" descr="Forma, Calendário, Círculo&#10;&#10;Descrição gerada automaticamente">
+            <a:extLst>
+              <a:ext uri="{FF2B5EF4-FFF2-40B4-BE49-F238E27FC236}">
+                <a16:creationId xmlns:a16="http://schemas.microsoft.com/office/drawing/2014/main" id="{BCBEE721-11DA-754A-9982-ECE2A09EB3EE}"/>
+              </a:ext>
+            </a:extLst>
+          </p:cNvPr>
+          <p:cNvPicPr>
+            <a:picLocks noGrp="1" noChangeAspect="1"/>
+          </p:cNvPicPr>
+          <p:nvPr>
+            <p:ph type="pic" sz="quarter" idx="10"/>
+          </p:nvPr>
+        </p:nvPicPr>
+        <p:blipFill>
+          <a:blip r:embed="rId2" cstate="screen">
+            <a:extLst>
+              <a:ext uri="{28A0092B-C50C-407E-A947-70E740481C1C}">
+                <a14:useLocalDpi xmlns:a14="http://schemas.microsoft.com/office/drawing/2010/main"/>
+              </a:ext>
+              <a:ext uri="{837473B0-CC2E-450A-ABE3-18F120FF3D39}">
+                <a1611:picAttrSrcUrl xmlns:a1611="http://schemas.microsoft.com/office/drawing/2016/11/main" r:id="rId3"/>
+              </a:ext>
+            </a:extLst>
+          </a:blip>
+          <a:srcRect/>
+          <a:stretch>
+            <a:fillRect/>
+          </a:stretch>
+        </p:blipFill>
+        <p:spPr/>
+      </p:pic>
+      <p:sp>
+        <p:nvSpPr>
+          <p:cNvPr id="4" name="Espaço Reservado para Texto 3">
+            <a:extLst>
+              <a:ext uri="{FF2B5EF4-FFF2-40B4-BE49-F238E27FC236}">
+                <a16:creationId xmlns:a16="http://schemas.microsoft.com/office/drawing/2014/main" id="{1C04FEA0-CAB9-7D4D-A063-B8F0835412A1}"/>
+              </a:ext>
+            </a:extLst>
+          </p:cNvPr>
+          <p:cNvSpPr>
+            <a:spLocks noGrp="1"/>
+          </p:cNvSpPr>
+          <p:nvPr>
+            <p:ph type="body" sz="quarter" idx="11"/>
+          </p:nvPr>
+        </p:nvSpPr>
+        <p:spPr>
+          <a:xfrm>
+            <a:off x="3596230" y="524050"/>
             <a:ext cx="5236068" cy="3032125"/>
           </a:xfrm>
         </p:spPr>
@@ -7336,42 +7626,948 @@
           </a:p>
         </p:txBody>
       </p:sp>
-      <p:pic>
-        <p:nvPicPr>
-          <p:cNvPr id="3" name="Imagem 2">
+      <p:graphicFrame>
+        <p:nvGraphicFramePr>
+          <p:cNvPr id="5" name="Table 4">
             <a:extLst>
               <a:ext uri="{FF2B5EF4-FFF2-40B4-BE49-F238E27FC236}">
-                <a16:creationId xmlns:a16="http://schemas.microsoft.com/office/drawing/2014/main" id="{1A57FA59-CFE2-D542-83F1-2FAA2CB278EB}"/>
+                <a16:creationId xmlns:a16="http://schemas.microsoft.com/office/drawing/2014/main" id="{D764108B-E9C8-BAD5-A6D5-99307AC4FD17}"/>
               </a:ext>
             </a:extLst>
           </p:cNvPr>
-          <p:cNvPicPr>
-            <a:picLocks noChangeAspect="1"/>
-          </p:cNvPicPr>
-          <p:nvPr/>
-        </p:nvPicPr>
-        <p:blipFill>
-          <a:blip r:embed="rId5" cstate="screen">
-            <a:extLst>
-              <a:ext uri="{28A0092B-C50C-407E-A947-70E740481C1C}">
-                <a14:useLocalDpi xmlns:a14="http://schemas.microsoft.com/office/drawing/2010/main"/>
-              </a:ext>
-            </a:extLst>
-          </a:blip>
-          <a:stretch>
-            <a:fillRect/>
-          </a:stretch>
-        </p:blipFill>
-        <p:spPr>
-          <a:xfrm>
-            <a:off x="5018048" y="1448175"/>
-            <a:ext cx="2643373" cy="3531000"/>
-          </a:xfrm>
-          <a:prstGeom prst="rect">
-            <a:avLst/>
-          </a:prstGeom>
-        </p:spPr>
-      </p:pic>
+          <p:cNvGraphicFramePr>
+            <a:graphicFrameLocks noGrp="1"/>
+          </p:cNvGraphicFramePr>
+          <p:nvPr>
+            <p:extLst>
+              <p:ext uri="{D42A27DB-BD31-4B8C-83A1-F6EECF244321}">
+                <p14:modId xmlns:p14="http://schemas.microsoft.com/office/powerpoint/2010/main" val="791914571"/>
+              </p:ext>
+            </p:extLst>
+          </p:nvPr>
+        </p:nvGraphicFramePr>
+        <p:xfrm>
+          <a:off x="4821993" y="1058426"/>
+          <a:ext cx="3367176" cy="3980040"/>
+        </p:xfrm>
+        <a:graphic>
+          <a:graphicData uri="http://schemas.openxmlformats.org/drawingml/2006/table">
+            <a:tbl>
+              <a:tblPr firstRow="1">
+                <a:tableStyleId>{9D7B26C5-4107-4FEC-AEDC-1716B250A1EF}</a:tableStyleId>
+              </a:tblPr>
+              <a:tblGrid>
+                <a:gridCol w="1122392">
+                  <a:extLst>
+                    <a:ext uri="{9D8B030D-6E8A-4147-A177-3AD203B41FA5}">
+                      <a16:colId xmlns:a16="http://schemas.microsoft.com/office/drawing/2014/main" val="3809258294"/>
+                    </a:ext>
+                  </a:extLst>
+                </a:gridCol>
+                <a:gridCol w="1122392">
+                  <a:extLst>
+                    <a:ext uri="{9D8B030D-6E8A-4147-A177-3AD203B41FA5}">
+                      <a16:colId xmlns:a16="http://schemas.microsoft.com/office/drawing/2014/main" val="3757951994"/>
+                    </a:ext>
+                  </a:extLst>
+                </a:gridCol>
+                <a:gridCol w="1122392">
+                  <a:extLst>
+                    <a:ext uri="{9D8B030D-6E8A-4147-A177-3AD203B41FA5}">
+                      <a16:colId xmlns:a16="http://schemas.microsoft.com/office/drawing/2014/main" val="1970167585"/>
+                    </a:ext>
+                  </a:extLst>
+                </a:gridCol>
+              </a:tblGrid>
+              <a:tr h="160995">
+                <a:tc>
+                  <a:txBody>
+                    <a:bodyPr/>
+                    <a:lstStyle/>
+                    <a:p>
+                      <a:pPr algn="ctr"/>
+                      <a:r>
+                        <a:rPr lang="en-BR" sz="1300" dirty="0"/>
+                        <a:t>Subset</a:t>
+                      </a:r>
+                    </a:p>
+                  </a:txBody>
+                  <a:tcPr marT="18000" marB="18000"/>
+                </a:tc>
+                <a:tc>
+                  <a:txBody>
+                    <a:bodyPr/>
+                    <a:lstStyle/>
+                    <a:p>
+                      <a:pPr algn="ctr"/>
+                      <a:r>
+                        <a:rPr lang="en-BR" sz="1300" dirty="0"/>
+                        <a:t>Peso Total</a:t>
+                      </a:r>
+                    </a:p>
+                  </a:txBody>
+                  <a:tcPr marT="18000" marB="18000"/>
+                </a:tc>
+                <a:tc>
+                  <a:txBody>
+                    <a:bodyPr/>
+                    <a:lstStyle/>
+                    <a:p>
+                      <a:pPr algn="ctr"/>
+                      <a:r>
+                        <a:rPr lang="en-BR" sz="1300" dirty="0"/>
+                        <a:t>Valor Total</a:t>
+                      </a:r>
+                    </a:p>
+                  </a:txBody>
+                  <a:tcPr marT="18000" marB="18000"/>
+                </a:tc>
+                <a:extLst>
+                  <a:ext uri="{0D108BD9-81ED-4DB2-BD59-A6C34878D82A}">
+                    <a16:rowId xmlns:a16="http://schemas.microsoft.com/office/drawing/2014/main" val="1495222055"/>
+                  </a:ext>
+                </a:extLst>
+              </a:tr>
+              <a:tr h="160995">
+                <a:tc>
+                  <a:txBody>
+                    <a:bodyPr/>
+                    <a:lstStyle/>
+                    <a:p>
+                      <a:pPr algn="ctr"/>
+                      <a:r>
+                        <a:rPr lang="en-BR" sz="1300" dirty="0"/>
+                        <a:t>{}</a:t>
+                      </a:r>
+                    </a:p>
+                  </a:txBody>
+                  <a:tcPr marT="18000" marB="18000"/>
+                </a:tc>
+                <a:tc>
+                  <a:txBody>
+                    <a:bodyPr/>
+                    <a:lstStyle/>
+                    <a:p>
+                      <a:pPr algn="ctr"/>
+                      <a:r>
+                        <a:rPr lang="en-BR" sz="1300" dirty="0"/>
+                        <a:t>0</a:t>
+                      </a:r>
+                    </a:p>
+                  </a:txBody>
+                  <a:tcPr marT="18000" marB="18000"/>
+                </a:tc>
+                <a:tc>
+                  <a:txBody>
+                    <a:bodyPr/>
+                    <a:lstStyle/>
+                    <a:p>
+                      <a:pPr algn="ctr"/>
+                      <a:r>
+                        <a:rPr lang="en-BR" sz="1300" dirty="0"/>
+                        <a:t>$0</a:t>
+                      </a:r>
+                    </a:p>
+                  </a:txBody>
+                  <a:tcPr marT="18000" marB="18000"/>
+                </a:tc>
+                <a:extLst>
+                  <a:ext uri="{0D108BD9-81ED-4DB2-BD59-A6C34878D82A}">
+                    <a16:rowId xmlns:a16="http://schemas.microsoft.com/office/drawing/2014/main" val="3480083286"/>
+                  </a:ext>
+                </a:extLst>
+              </a:tr>
+              <a:tr h="160995">
+                <a:tc>
+                  <a:txBody>
+                    <a:bodyPr/>
+                    <a:lstStyle/>
+                    <a:p>
+                      <a:pPr algn="ctr"/>
+                      <a:r>
+                        <a:rPr lang="en-BR" sz="1300" dirty="0"/>
+                        <a:t>{1}</a:t>
+                      </a:r>
+                    </a:p>
+                  </a:txBody>
+                  <a:tcPr marT="18000" marB="18000"/>
+                </a:tc>
+                <a:tc>
+                  <a:txBody>
+                    <a:bodyPr/>
+                    <a:lstStyle/>
+                    <a:p>
+                      <a:pPr algn="ctr"/>
+                      <a:r>
+                        <a:rPr lang="en-BR" sz="1300" dirty="0"/>
+                        <a:t>2</a:t>
+                      </a:r>
+                    </a:p>
+                  </a:txBody>
+                  <a:tcPr marT="18000" marB="18000"/>
+                </a:tc>
+                <a:tc>
+                  <a:txBody>
+                    <a:bodyPr/>
+                    <a:lstStyle/>
+                    <a:p>
+                      <a:pPr algn="ctr"/>
+                      <a:r>
+                        <a:rPr lang="en-BR" sz="1300" dirty="0"/>
+                        <a:t>$20</a:t>
+                      </a:r>
+                    </a:p>
+                  </a:txBody>
+                  <a:tcPr marT="18000" marB="18000"/>
+                </a:tc>
+                <a:extLst>
+                  <a:ext uri="{0D108BD9-81ED-4DB2-BD59-A6C34878D82A}">
+                    <a16:rowId xmlns:a16="http://schemas.microsoft.com/office/drawing/2014/main" val="3498475793"/>
+                  </a:ext>
+                </a:extLst>
+              </a:tr>
+              <a:tr h="160995">
+                <a:tc>
+                  <a:txBody>
+                    <a:bodyPr/>
+                    <a:lstStyle/>
+                    <a:p>
+                      <a:pPr algn="ctr"/>
+                      <a:r>
+                        <a:rPr lang="en-BR" sz="1300" dirty="0"/>
+                        <a:t>{2}</a:t>
+                      </a:r>
+                    </a:p>
+                  </a:txBody>
+                  <a:tcPr marT="18000" marB="18000"/>
+                </a:tc>
+                <a:tc>
+                  <a:txBody>
+                    <a:bodyPr/>
+                    <a:lstStyle/>
+                    <a:p>
+                      <a:pPr algn="ctr"/>
+                      <a:r>
+                        <a:rPr lang="en-BR" sz="1300" dirty="0"/>
+                        <a:t>5</a:t>
+                      </a:r>
+                    </a:p>
+                  </a:txBody>
+                  <a:tcPr marT="18000" marB="18000"/>
+                </a:tc>
+                <a:tc>
+                  <a:txBody>
+                    <a:bodyPr/>
+                    <a:lstStyle/>
+                    <a:p>
+                      <a:pPr algn="ctr"/>
+                      <a:r>
+                        <a:rPr lang="en-BR" sz="1300" dirty="0"/>
+                        <a:t>$30</a:t>
+                      </a:r>
+                    </a:p>
+                  </a:txBody>
+                  <a:tcPr marT="18000" marB="18000"/>
+                </a:tc>
+                <a:extLst>
+                  <a:ext uri="{0D108BD9-81ED-4DB2-BD59-A6C34878D82A}">
+                    <a16:rowId xmlns:a16="http://schemas.microsoft.com/office/drawing/2014/main" val="2239246318"/>
+                  </a:ext>
+                </a:extLst>
+              </a:tr>
+              <a:tr h="160995">
+                <a:tc>
+                  <a:txBody>
+                    <a:bodyPr/>
+                    <a:lstStyle/>
+                    <a:p>
+                      <a:pPr algn="ctr"/>
+                      <a:r>
+                        <a:rPr lang="en-BR" sz="1300" dirty="0"/>
+                        <a:t>{3}</a:t>
+                      </a:r>
+                    </a:p>
+                  </a:txBody>
+                  <a:tcPr marT="18000" marB="18000"/>
+                </a:tc>
+                <a:tc>
+                  <a:txBody>
+                    <a:bodyPr/>
+                    <a:lstStyle/>
+                    <a:p>
+                      <a:pPr algn="ctr"/>
+                      <a:r>
+                        <a:rPr lang="en-BR" sz="1300" dirty="0"/>
+                        <a:t>10</a:t>
+                      </a:r>
+                    </a:p>
+                  </a:txBody>
+                  <a:tcPr marT="18000" marB="18000"/>
+                </a:tc>
+                <a:tc>
+                  <a:txBody>
+                    <a:bodyPr/>
+                    <a:lstStyle/>
+                    <a:p>
+                      <a:pPr algn="ctr"/>
+                      <a:r>
+                        <a:rPr lang="en-BR" sz="1300" dirty="0"/>
+                        <a:t>$50</a:t>
+                      </a:r>
+                    </a:p>
+                  </a:txBody>
+                  <a:tcPr marT="18000" marB="18000"/>
+                </a:tc>
+                <a:extLst>
+                  <a:ext uri="{0D108BD9-81ED-4DB2-BD59-A6C34878D82A}">
+                    <a16:rowId xmlns:a16="http://schemas.microsoft.com/office/drawing/2014/main" val="2009142925"/>
+                  </a:ext>
+                </a:extLst>
+              </a:tr>
+              <a:tr h="160995">
+                <a:tc>
+                  <a:txBody>
+                    <a:bodyPr/>
+                    <a:lstStyle/>
+                    <a:p>
+                      <a:pPr algn="ctr"/>
+                      <a:r>
+                        <a:rPr lang="en-BR" sz="1300" dirty="0"/>
+                        <a:t>{4}</a:t>
+                      </a:r>
+                    </a:p>
+                  </a:txBody>
+                  <a:tcPr marT="18000" marB="18000"/>
+                </a:tc>
+                <a:tc>
+                  <a:txBody>
+                    <a:bodyPr/>
+                    <a:lstStyle/>
+                    <a:p>
+                      <a:pPr algn="ctr"/>
+                      <a:r>
+                        <a:rPr lang="en-BR" sz="1300" dirty="0"/>
+                        <a:t>5</a:t>
+                      </a:r>
+                    </a:p>
+                  </a:txBody>
+                  <a:tcPr marT="18000" marB="18000"/>
+                </a:tc>
+                <a:tc>
+                  <a:txBody>
+                    <a:bodyPr/>
+                    <a:lstStyle/>
+                    <a:p>
+                      <a:pPr algn="ctr"/>
+                      <a:r>
+                        <a:rPr lang="en-BR" sz="1300" dirty="0"/>
+                        <a:t>$10</a:t>
+                      </a:r>
+                    </a:p>
+                  </a:txBody>
+                  <a:tcPr marT="18000" marB="18000"/>
+                </a:tc>
+                <a:extLst>
+                  <a:ext uri="{0D108BD9-81ED-4DB2-BD59-A6C34878D82A}">
+                    <a16:rowId xmlns:a16="http://schemas.microsoft.com/office/drawing/2014/main" val="3296735961"/>
+                  </a:ext>
+                </a:extLst>
+              </a:tr>
+              <a:tr h="160995">
+                <a:tc>
+                  <a:txBody>
+                    <a:bodyPr/>
+                    <a:lstStyle/>
+                    <a:p>
+                      <a:pPr algn="ctr"/>
+                      <a:r>
+                        <a:rPr lang="en-BR" sz="1300" dirty="0"/>
+                        <a:t>{1,2}</a:t>
+                      </a:r>
+                    </a:p>
+                  </a:txBody>
+                  <a:tcPr marT="18000" marB="18000"/>
+                </a:tc>
+                <a:tc>
+                  <a:txBody>
+                    <a:bodyPr/>
+                    <a:lstStyle/>
+                    <a:p>
+                      <a:pPr algn="ctr"/>
+                      <a:r>
+                        <a:rPr lang="en-BR" sz="1300" dirty="0"/>
+                        <a:t>7</a:t>
+                      </a:r>
+                    </a:p>
+                  </a:txBody>
+                  <a:tcPr marT="18000" marB="18000"/>
+                </a:tc>
+                <a:tc>
+                  <a:txBody>
+                    <a:bodyPr/>
+                    <a:lstStyle/>
+                    <a:p>
+                      <a:pPr algn="ctr"/>
+                      <a:r>
+                        <a:rPr lang="en-BR" sz="1300" dirty="0"/>
+                        <a:t>$50</a:t>
+                      </a:r>
+                    </a:p>
+                  </a:txBody>
+                  <a:tcPr marT="18000" marB="18000"/>
+                </a:tc>
+                <a:extLst>
+                  <a:ext uri="{0D108BD9-81ED-4DB2-BD59-A6C34878D82A}">
+                    <a16:rowId xmlns:a16="http://schemas.microsoft.com/office/drawing/2014/main" val="2145605949"/>
+                  </a:ext>
+                </a:extLst>
+              </a:tr>
+              <a:tr h="160995">
+                <a:tc>
+                  <a:txBody>
+                    <a:bodyPr/>
+                    <a:lstStyle/>
+                    <a:p>
+                      <a:pPr algn="ctr"/>
+                      <a:r>
+                        <a:rPr lang="en-BR" sz="1300" dirty="0"/>
+                        <a:t>{1,3}</a:t>
+                      </a:r>
+                    </a:p>
+                  </a:txBody>
+                  <a:tcPr marT="18000" marB="18000"/>
+                </a:tc>
+                <a:tc>
+                  <a:txBody>
+                    <a:bodyPr/>
+                    <a:lstStyle/>
+                    <a:p>
+                      <a:pPr algn="ctr"/>
+                      <a:r>
+                        <a:rPr lang="en-BR" sz="1300" dirty="0"/>
+                        <a:t>12</a:t>
+                      </a:r>
+                    </a:p>
+                  </a:txBody>
+                  <a:tcPr marT="18000" marB="18000"/>
+                </a:tc>
+                <a:tc>
+                  <a:txBody>
+                    <a:bodyPr/>
+                    <a:lstStyle/>
+                    <a:p>
+                      <a:pPr algn="ctr"/>
+                      <a:r>
+                        <a:rPr lang="en-BR" sz="1300" dirty="0"/>
+                        <a:t>$70</a:t>
+                      </a:r>
+                    </a:p>
+                  </a:txBody>
+                  <a:tcPr marT="18000" marB="18000"/>
+                </a:tc>
+                <a:extLst>
+                  <a:ext uri="{0D108BD9-81ED-4DB2-BD59-A6C34878D82A}">
+                    <a16:rowId xmlns:a16="http://schemas.microsoft.com/office/drawing/2014/main" val="3941052691"/>
+                  </a:ext>
+                </a:extLst>
+              </a:tr>
+              <a:tr h="160995">
+                <a:tc>
+                  <a:txBody>
+                    <a:bodyPr/>
+                    <a:lstStyle/>
+                    <a:p>
+                      <a:pPr algn="ctr"/>
+                      <a:r>
+                        <a:rPr lang="en-BR" sz="1300" dirty="0"/>
+                        <a:t>{1,4}</a:t>
+                      </a:r>
+                    </a:p>
+                  </a:txBody>
+                  <a:tcPr marT="18000" marB="18000"/>
+                </a:tc>
+                <a:tc>
+                  <a:txBody>
+                    <a:bodyPr/>
+                    <a:lstStyle/>
+                    <a:p>
+                      <a:pPr algn="ctr"/>
+                      <a:r>
+                        <a:rPr lang="en-BR" sz="1300" dirty="0"/>
+                        <a:t>7</a:t>
+                      </a:r>
+                    </a:p>
+                  </a:txBody>
+                  <a:tcPr marT="18000" marB="18000"/>
+                </a:tc>
+                <a:tc>
+                  <a:txBody>
+                    <a:bodyPr/>
+                    <a:lstStyle/>
+                    <a:p>
+                      <a:pPr algn="ctr"/>
+                      <a:r>
+                        <a:rPr lang="en-BR" sz="1300" dirty="0"/>
+                        <a:t>$30</a:t>
+                      </a:r>
+                    </a:p>
+                  </a:txBody>
+                  <a:tcPr marT="18000" marB="18000"/>
+                </a:tc>
+                <a:extLst>
+                  <a:ext uri="{0D108BD9-81ED-4DB2-BD59-A6C34878D82A}">
+                    <a16:rowId xmlns:a16="http://schemas.microsoft.com/office/drawing/2014/main" val="285518567"/>
+                  </a:ext>
+                </a:extLst>
+              </a:tr>
+              <a:tr h="160995">
+                <a:tc>
+                  <a:txBody>
+                    <a:bodyPr/>
+                    <a:lstStyle/>
+                    <a:p>
+                      <a:pPr algn="ctr"/>
+                      <a:r>
+                        <a:rPr lang="en-BR" sz="1300" dirty="0"/>
+                        <a:t>{2,3}</a:t>
+                      </a:r>
+                    </a:p>
+                  </a:txBody>
+                  <a:tcPr marT="18000" marB="18000"/>
+                </a:tc>
+                <a:tc>
+                  <a:txBody>
+                    <a:bodyPr/>
+                    <a:lstStyle/>
+                    <a:p>
+                      <a:pPr algn="ctr"/>
+                      <a:r>
+                        <a:rPr lang="en-BR" sz="1300" dirty="0"/>
+                        <a:t>15</a:t>
+                      </a:r>
+                    </a:p>
+                  </a:txBody>
+                  <a:tcPr marT="18000" marB="18000"/>
+                </a:tc>
+                <a:tc>
+                  <a:txBody>
+                    <a:bodyPr/>
+                    <a:lstStyle/>
+                    <a:p>
+                      <a:pPr algn="ctr"/>
+                      <a:r>
+                        <a:rPr lang="en-BR" sz="1300" dirty="0"/>
+                        <a:t>$80</a:t>
+                      </a:r>
+                    </a:p>
+                  </a:txBody>
+                  <a:tcPr marT="18000" marB="18000"/>
+                </a:tc>
+                <a:extLst>
+                  <a:ext uri="{0D108BD9-81ED-4DB2-BD59-A6C34878D82A}">
+                    <a16:rowId xmlns:a16="http://schemas.microsoft.com/office/drawing/2014/main" val="3564324511"/>
+                  </a:ext>
+                </a:extLst>
+              </a:tr>
+              <a:tr h="160995">
+                <a:tc>
+                  <a:txBody>
+                    <a:bodyPr/>
+                    <a:lstStyle/>
+                    <a:p>
+                      <a:pPr algn="ctr"/>
+                      <a:r>
+                        <a:rPr lang="en-BR" sz="1300" dirty="0"/>
+                        <a:t>{2,4}</a:t>
+                      </a:r>
+                    </a:p>
+                  </a:txBody>
+                  <a:tcPr marT="18000" marB="18000"/>
+                </a:tc>
+                <a:tc>
+                  <a:txBody>
+                    <a:bodyPr/>
+                    <a:lstStyle/>
+                    <a:p>
+                      <a:pPr algn="ctr"/>
+                      <a:r>
+                        <a:rPr lang="en-BR" sz="1300" dirty="0"/>
+                        <a:t>10</a:t>
+                      </a:r>
+                    </a:p>
+                  </a:txBody>
+                  <a:tcPr marT="18000" marB="18000"/>
+                </a:tc>
+                <a:tc>
+                  <a:txBody>
+                    <a:bodyPr/>
+                    <a:lstStyle/>
+                    <a:p>
+                      <a:pPr algn="ctr"/>
+                      <a:r>
+                        <a:rPr lang="en-BR" sz="1300" dirty="0"/>
+                        <a:t>$40</a:t>
+                      </a:r>
+                    </a:p>
+                  </a:txBody>
+                  <a:tcPr marT="18000" marB="18000"/>
+                </a:tc>
+                <a:extLst>
+                  <a:ext uri="{0D108BD9-81ED-4DB2-BD59-A6C34878D82A}">
+                    <a16:rowId xmlns:a16="http://schemas.microsoft.com/office/drawing/2014/main" val="265095244"/>
+                  </a:ext>
+                </a:extLst>
+              </a:tr>
+              <a:tr h="160995">
+                <a:tc>
+                  <a:txBody>
+                    <a:bodyPr/>
+                    <a:lstStyle/>
+                    <a:p>
+                      <a:pPr algn="ctr"/>
+                      <a:r>
+                        <a:rPr lang="en-BR" sz="1300" dirty="0"/>
+                        <a:t>{3,4}</a:t>
+                      </a:r>
+                    </a:p>
+                  </a:txBody>
+                  <a:tcPr marT="18000" marB="18000"/>
+                </a:tc>
+                <a:tc>
+                  <a:txBody>
+                    <a:bodyPr/>
+                    <a:lstStyle/>
+                    <a:p>
+                      <a:pPr algn="ctr"/>
+                      <a:r>
+                        <a:rPr lang="en-BR" sz="1300" dirty="0"/>
+                        <a:t>15</a:t>
+                      </a:r>
+                    </a:p>
+                  </a:txBody>
+                  <a:tcPr marT="18000" marB="18000"/>
+                </a:tc>
+                <a:tc>
+                  <a:txBody>
+                    <a:bodyPr/>
+                    <a:lstStyle/>
+                    <a:p>
+                      <a:pPr algn="ctr"/>
+                      <a:r>
+                        <a:rPr lang="en-BR" sz="1300" dirty="0"/>
+                        <a:t>$60</a:t>
+                      </a:r>
+                    </a:p>
+                  </a:txBody>
+                  <a:tcPr marT="18000" marB="18000"/>
+                </a:tc>
+                <a:extLst>
+                  <a:ext uri="{0D108BD9-81ED-4DB2-BD59-A6C34878D82A}">
+                    <a16:rowId xmlns:a16="http://schemas.microsoft.com/office/drawing/2014/main" val="1561920342"/>
+                  </a:ext>
+                </a:extLst>
+              </a:tr>
+              <a:tr h="160995">
+                <a:tc>
+                  <a:txBody>
+                    <a:bodyPr/>
+                    <a:lstStyle/>
+                    <a:p>
+                      <a:pPr algn="ctr"/>
+                      <a:r>
+                        <a:rPr lang="en-BR" sz="1300" dirty="0"/>
+                        <a:t>{1,2,3}</a:t>
+                      </a:r>
+                    </a:p>
+                  </a:txBody>
+                  <a:tcPr marT="18000" marB="18000"/>
+                </a:tc>
+                <a:tc>
+                  <a:txBody>
+                    <a:bodyPr/>
+                    <a:lstStyle/>
+                    <a:p>
+                      <a:pPr algn="ctr"/>
+                      <a:r>
+                        <a:rPr lang="en-BR" sz="1300" dirty="0"/>
+                        <a:t>17</a:t>
+                      </a:r>
+                    </a:p>
+                  </a:txBody>
+                  <a:tcPr marT="18000" marB="18000"/>
+                </a:tc>
+                <a:tc>
+                  <a:txBody>
+                    <a:bodyPr/>
+                    <a:lstStyle/>
+                    <a:p>
+                      <a:pPr algn="ctr"/>
+                      <a:r>
+                        <a:rPr lang="en-US" sz="1300" dirty="0"/>
+                        <a:t>n</a:t>
+                      </a:r>
+                      <a:r>
+                        <a:rPr lang="en-BR" sz="1300" dirty="0"/>
+                        <a:t>ão viável</a:t>
+                      </a:r>
+                    </a:p>
+                  </a:txBody>
+                  <a:tcPr marT="18000" marB="18000"/>
+                </a:tc>
+                <a:extLst>
+                  <a:ext uri="{0D108BD9-81ED-4DB2-BD59-A6C34878D82A}">
+                    <a16:rowId xmlns:a16="http://schemas.microsoft.com/office/drawing/2014/main" val="355150342"/>
+                  </a:ext>
+                </a:extLst>
+              </a:tr>
+              <a:tr h="160995">
+                <a:tc>
+                  <a:txBody>
+                    <a:bodyPr/>
+                    <a:lstStyle/>
+                    <a:p>
+                      <a:pPr algn="ctr"/>
+                      <a:r>
+                        <a:rPr lang="en-BR" sz="1300" dirty="0"/>
+                        <a:t>{1,2,4}</a:t>
+                      </a:r>
+                    </a:p>
+                  </a:txBody>
+                  <a:tcPr marT="18000" marB="18000"/>
+                </a:tc>
+                <a:tc>
+                  <a:txBody>
+                    <a:bodyPr/>
+                    <a:lstStyle/>
+                    <a:p>
+                      <a:pPr algn="ctr"/>
+                      <a:r>
+                        <a:rPr lang="en-BR" sz="1300" dirty="0"/>
+                        <a:t>12</a:t>
+                      </a:r>
+                    </a:p>
+                  </a:txBody>
+                  <a:tcPr marT="18000" marB="18000"/>
+                </a:tc>
+                <a:tc>
+                  <a:txBody>
+                    <a:bodyPr/>
+                    <a:lstStyle/>
+                    <a:p>
+                      <a:pPr algn="ctr"/>
+                      <a:r>
+                        <a:rPr lang="en-BR" sz="1300" dirty="0"/>
+                        <a:t>$60</a:t>
+                      </a:r>
+                    </a:p>
+                  </a:txBody>
+                  <a:tcPr marT="18000" marB="18000"/>
+                </a:tc>
+                <a:extLst>
+                  <a:ext uri="{0D108BD9-81ED-4DB2-BD59-A6C34878D82A}">
+                    <a16:rowId xmlns:a16="http://schemas.microsoft.com/office/drawing/2014/main" val="1004215967"/>
+                  </a:ext>
+                </a:extLst>
+              </a:tr>
+              <a:tr h="160995">
+                <a:tc>
+                  <a:txBody>
+                    <a:bodyPr/>
+                    <a:lstStyle/>
+                    <a:p>
+                      <a:pPr algn="ctr"/>
+                      <a:r>
+                        <a:rPr lang="en-BR" sz="1300" dirty="0"/>
+                        <a:t>{1,3,4}</a:t>
+                      </a:r>
+                    </a:p>
+                  </a:txBody>
+                  <a:tcPr marT="18000" marB="18000"/>
+                </a:tc>
+                <a:tc>
+                  <a:txBody>
+                    <a:bodyPr/>
+                    <a:lstStyle/>
+                    <a:p>
+                      <a:pPr algn="ctr"/>
+                      <a:r>
+                        <a:rPr lang="en-BR" sz="1300" dirty="0"/>
+                        <a:t>17</a:t>
+                      </a:r>
+                    </a:p>
+                  </a:txBody>
+                  <a:tcPr marT="18000" marB="18000"/>
+                </a:tc>
+                <a:tc>
+                  <a:txBody>
+                    <a:bodyPr/>
+                    <a:lstStyle/>
+                    <a:p>
+                      <a:pPr algn="ctr"/>
+                      <a:r>
+                        <a:rPr lang="en-US" sz="1300" dirty="0"/>
+                        <a:t>n</a:t>
+                      </a:r>
+                      <a:r>
+                        <a:rPr lang="en-BR" sz="1300" dirty="0"/>
+                        <a:t>ão viável</a:t>
+                      </a:r>
+                    </a:p>
+                  </a:txBody>
+                  <a:tcPr marT="18000" marB="18000"/>
+                </a:tc>
+                <a:extLst>
+                  <a:ext uri="{0D108BD9-81ED-4DB2-BD59-A6C34878D82A}">
+                    <a16:rowId xmlns:a16="http://schemas.microsoft.com/office/drawing/2014/main" val="3064455765"/>
+                  </a:ext>
+                </a:extLst>
+              </a:tr>
+              <a:tr h="160995">
+                <a:tc>
+                  <a:txBody>
+                    <a:bodyPr/>
+                    <a:lstStyle/>
+                    <a:p>
+                      <a:pPr algn="ctr"/>
+                      <a:r>
+                        <a:rPr lang="en-BR" sz="1300" dirty="0"/>
+                        <a:t>{2,3,4}</a:t>
+                      </a:r>
+                    </a:p>
+                  </a:txBody>
+                  <a:tcPr marT="18000" marB="18000"/>
+                </a:tc>
+                <a:tc>
+                  <a:txBody>
+                    <a:bodyPr/>
+                    <a:lstStyle/>
+                    <a:p>
+                      <a:pPr algn="ctr"/>
+                      <a:r>
+                        <a:rPr lang="en-BR" sz="1300" dirty="0"/>
+                        <a:t>20</a:t>
+                      </a:r>
+                    </a:p>
+                  </a:txBody>
+                  <a:tcPr marT="18000" marB="18000"/>
+                </a:tc>
+                <a:tc>
+                  <a:txBody>
+                    <a:bodyPr/>
+                    <a:lstStyle/>
+                    <a:p>
+                      <a:pPr marL="0" marR="0" lvl="0" indent="0" algn="ctr" defTabSz="914400" rtl="0" eaLnBrk="1" fontAlgn="auto" latinLnBrk="0" hangingPunct="1">
+                        <a:lnSpc>
+                          <a:spcPct val="100000"/>
+                        </a:lnSpc>
+                        <a:spcBef>
+                          <a:spcPts val="0"/>
+                        </a:spcBef>
+                        <a:spcAft>
+                          <a:spcPts val="0"/>
+                        </a:spcAft>
+                        <a:buClr>
+                          <a:srgbClr val="000000"/>
+                        </a:buClr>
+                        <a:buSzTx/>
+                        <a:buFont typeface="Arial"/>
+                        <a:buNone/>
+                        <a:tabLst/>
+                        <a:defRPr/>
+                      </a:pPr>
+                      <a:r>
+                        <a:rPr lang="en-US" sz="1300" dirty="0"/>
+                        <a:t>n</a:t>
+                      </a:r>
+                      <a:r>
+                        <a:rPr lang="en-BR" sz="1300" dirty="0"/>
+                        <a:t>ão viável</a:t>
+                      </a:r>
+                    </a:p>
+                  </a:txBody>
+                  <a:tcPr marT="18000" marB="18000"/>
+                </a:tc>
+                <a:extLst>
+                  <a:ext uri="{0D108BD9-81ED-4DB2-BD59-A6C34878D82A}">
+                    <a16:rowId xmlns:a16="http://schemas.microsoft.com/office/drawing/2014/main" val="1582221001"/>
+                  </a:ext>
+                </a:extLst>
+              </a:tr>
+              <a:tr h="160995">
+                <a:tc>
+                  <a:txBody>
+                    <a:bodyPr/>
+                    <a:lstStyle/>
+                    <a:p>
+                      <a:pPr algn="ctr"/>
+                      <a:r>
+                        <a:rPr lang="en-BR" sz="1300" dirty="0"/>
+                        <a:t>{1,2,3,4}</a:t>
+                      </a:r>
+                    </a:p>
+                  </a:txBody>
+                  <a:tcPr marT="18000" marB="18000"/>
+                </a:tc>
+                <a:tc>
+                  <a:txBody>
+                    <a:bodyPr/>
+                    <a:lstStyle/>
+                    <a:p>
+                      <a:pPr algn="ctr"/>
+                      <a:r>
+                        <a:rPr lang="en-BR" sz="1300" dirty="0"/>
+                        <a:t>22</a:t>
+                      </a:r>
+                    </a:p>
+                  </a:txBody>
+                  <a:tcPr marT="18000" marB="18000"/>
+                </a:tc>
+                <a:tc>
+                  <a:txBody>
+                    <a:bodyPr/>
+                    <a:lstStyle/>
+                    <a:p>
+                      <a:pPr marL="0" marR="0" lvl="0" indent="0" algn="ctr" defTabSz="914400" rtl="0" eaLnBrk="1" fontAlgn="auto" latinLnBrk="0" hangingPunct="1">
+                        <a:lnSpc>
+                          <a:spcPct val="100000"/>
+                        </a:lnSpc>
+                        <a:spcBef>
+                          <a:spcPts val="0"/>
+                        </a:spcBef>
+                        <a:spcAft>
+                          <a:spcPts val="0"/>
+                        </a:spcAft>
+                        <a:buClr>
+                          <a:srgbClr val="000000"/>
+                        </a:buClr>
+                        <a:buSzTx/>
+                        <a:buFont typeface="Arial"/>
+                        <a:buNone/>
+                        <a:tabLst/>
+                        <a:defRPr/>
+                      </a:pPr>
+                      <a:r>
+                        <a:rPr lang="en-US" sz="1300" dirty="0"/>
+                        <a:t>n</a:t>
+                      </a:r>
+                      <a:r>
+                        <a:rPr lang="en-BR" sz="1300" dirty="0"/>
+                        <a:t>ão viável</a:t>
+                      </a:r>
+                    </a:p>
+                  </a:txBody>
+                  <a:tcPr marT="18000" marB="18000"/>
+                </a:tc>
+                <a:extLst>
+                  <a:ext uri="{0D108BD9-81ED-4DB2-BD59-A6C34878D82A}">
+                    <a16:rowId xmlns:a16="http://schemas.microsoft.com/office/drawing/2014/main" val="978043737"/>
+                  </a:ext>
+                </a:extLst>
+              </a:tr>
+            </a:tbl>
+          </a:graphicData>
+        </a:graphic>
+      </p:graphicFrame>
     </p:spTree>
     <p:extLst>
       <p:ext uri="{BB962C8B-B14F-4D97-AF65-F5344CB8AC3E}">
@@ -7475,6 +8671,9 @@
               <a:rPr lang="pt-BR" dirty="0"/>
               <a:t>(1) Incluir na mochila </a:t>
             </a:r>
+          </a:p>
+          <a:p>
+            <a:endParaRPr lang="pt-BR" dirty="0"/>
           </a:p>
           <a:p>
             <a:endParaRPr lang="pt-BR" dirty="0"/>
@@ -7691,31 +8890,6 @@
               </a:rPr>
               <a:t>recursivo</a:t>
             </a:r>
-          </a:p>
-        </p:txBody>
-      </p:sp>
-      <p:sp>
-        <p:nvSpPr>
-          <p:cNvPr id="3" name="Espaço Reservado para Texto 2">
-            <a:extLst>
-              <a:ext uri="{FF2B5EF4-FFF2-40B4-BE49-F238E27FC236}">
-                <a16:creationId xmlns:a16="http://schemas.microsoft.com/office/drawing/2014/main" id="{20C37609-F39F-924B-832A-89C765EC6F4C}"/>
-              </a:ext>
-            </a:extLst>
-          </p:cNvPr>
-          <p:cNvSpPr>
-            <a:spLocks noGrp="1"/>
-          </p:cNvSpPr>
-          <p:nvPr>
-            <p:ph type="body" idx="1"/>
-          </p:nvPr>
-        </p:nvSpPr>
-        <p:spPr/>
-        <p:txBody>
-          <a:bodyPr/>
-          <a:lstStyle/>
-          <a:p>
-            <a:endParaRPr lang="pt-BR" dirty="0"/>
           </a:p>
         </p:txBody>
       </p:sp>

</xml_diff>